<commit_message>
Added matlab file that computes the expected voltage ranges
This matlab file assumes the voltage divider has the photoresistor as
the first resistor in the voltage divider.
</commit_message>
<xml_diff>
--- a/docs/wiring.pptx
+++ b/docs/wiring.pptx
@@ -104,6 +104,11 @@
       </a:defRPr>
     </a:lvl9pPr>
   </p:defaultTextStyle>
+  <p:extLst>
+    <p:ext uri="{EFAFB233-063F-42B5-8137-9DF3F51BA10A}">
+      <p15:sldGuideLst xmlns:p15="http://schemas.microsoft.com/office/powerpoint/2012/main"/>
+    </p:ext>
+  </p:extLst>
 </p:presentation>
 </file>
 
@@ -238,7 +243,7 @@
           <a:p>
             <a:fld id="{F91AB40E-11DA-42CE-93B8-E3535B8A82AA}" type="datetimeFigureOut">
               <a:rPr lang="en-US" smtClean="0"/>
-              <a:t>3/23/2017</a:t>
+              <a:t>3/27/2017</a:t>
             </a:fld>
             <a:endParaRPr lang="en-US"/>
           </a:p>
@@ -408,7 +413,7 @@
           <a:p>
             <a:fld id="{F91AB40E-11DA-42CE-93B8-E3535B8A82AA}" type="datetimeFigureOut">
               <a:rPr lang="en-US" smtClean="0"/>
-              <a:t>3/23/2017</a:t>
+              <a:t>3/27/2017</a:t>
             </a:fld>
             <a:endParaRPr lang="en-US"/>
           </a:p>
@@ -588,7 +593,7 @@
           <a:p>
             <a:fld id="{F91AB40E-11DA-42CE-93B8-E3535B8A82AA}" type="datetimeFigureOut">
               <a:rPr lang="en-US" smtClean="0"/>
-              <a:t>3/23/2017</a:t>
+              <a:t>3/27/2017</a:t>
             </a:fld>
             <a:endParaRPr lang="en-US"/>
           </a:p>
@@ -758,7 +763,7 @@
           <a:p>
             <a:fld id="{F91AB40E-11DA-42CE-93B8-E3535B8A82AA}" type="datetimeFigureOut">
               <a:rPr lang="en-US" smtClean="0"/>
-              <a:t>3/23/2017</a:t>
+              <a:t>3/27/2017</a:t>
             </a:fld>
             <a:endParaRPr lang="en-US"/>
           </a:p>
@@ -1004,7 +1009,7 @@
           <a:p>
             <a:fld id="{F91AB40E-11DA-42CE-93B8-E3535B8A82AA}" type="datetimeFigureOut">
               <a:rPr lang="en-US" smtClean="0"/>
-              <a:t>3/23/2017</a:t>
+              <a:t>3/27/2017</a:t>
             </a:fld>
             <a:endParaRPr lang="en-US"/>
           </a:p>
@@ -1236,7 +1241,7 @@
           <a:p>
             <a:fld id="{F91AB40E-11DA-42CE-93B8-E3535B8A82AA}" type="datetimeFigureOut">
               <a:rPr lang="en-US" smtClean="0"/>
-              <a:t>3/23/2017</a:t>
+              <a:t>3/27/2017</a:t>
             </a:fld>
             <a:endParaRPr lang="en-US"/>
           </a:p>
@@ -1603,7 +1608,7 @@
           <a:p>
             <a:fld id="{F91AB40E-11DA-42CE-93B8-E3535B8A82AA}" type="datetimeFigureOut">
               <a:rPr lang="en-US" smtClean="0"/>
-              <a:t>3/23/2017</a:t>
+              <a:t>3/27/2017</a:t>
             </a:fld>
             <a:endParaRPr lang="en-US"/>
           </a:p>
@@ -1721,7 +1726,7 @@
           <a:p>
             <a:fld id="{F91AB40E-11DA-42CE-93B8-E3535B8A82AA}" type="datetimeFigureOut">
               <a:rPr lang="en-US" smtClean="0"/>
-              <a:t>3/23/2017</a:t>
+              <a:t>3/27/2017</a:t>
             </a:fld>
             <a:endParaRPr lang="en-US"/>
           </a:p>
@@ -1816,7 +1821,7 @@
           <a:p>
             <a:fld id="{F91AB40E-11DA-42CE-93B8-E3535B8A82AA}" type="datetimeFigureOut">
               <a:rPr lang="en-US" smtClean="0"/>
-              <a:t>3/23/2017</a:t>
+              <a:t>3/27/2017</a:t>
             </a:fld>
             <a:endParaRPr lang="en-US"/>
           </a:p>
@@ -2093,7 +2098,7 @@
           <a:p>
             <a:fld id="{F91AB40E-11DA-42CE-93B8-E3535B8A82AA}" type="datetimeFigureOut">
               <a:rPr lang="en-US" smtClean="0"/>
-              <a:t>3/23/2017</a:t>
+              <a:t>3/27/2017</a:t>
             </a:fld>
             <a:endParaRPr lang="en-US"/>
           </a:p>
@@ -2346,7 +2351,7 @@
           <a:p>
             <a:fld id="{F91AB40E-11DA-42CE-93B8-E3535B8A82AA}" type="datetimeFigureOut">
               <a:rPr lang="en-US" smtClean="0"/>
-              <a:t>3/23/2017</a:t>
+              <a:t>3/27/2017</a:t>
             </a:fld>
             <a:endParaRPr lang="en-US"/>
           </a:p>
@@ -2559,7 +2564,7 @@
           <a:p>
             <a:fld id="{F91AB40E-11DA-42CE-93B8-E3535B8A82AA}" type="datetimeFigureOut">
               <a:rPr lang="en-US" smtClean="0"/>
-              <a:t>3/23/2017</a:t>
+              <a:t>3/27/2017</a:t>
             </a:fld>
             <a:endParaRPr lang="en-US"/>
           </a:p>

</xml_diff>

<commit_message>
added new wiring diagram to slides
</commit_message>
<xml_diff>
--- a/docs/wiring.pptx
+++ b/docs/wiring.pptx
@@ -8,6 +8,10 @@
     <p:sldId id="256" r:id="rId2"/>
     <p:sldId id="257" r:id="rId3"/>
     <p:sldId id="258" r:id="rId4"/>
+    <p:sldId id="261" r:id="rId5"/>
+    <p:sldId id="260" r:id="rId6"/>
+    <p:sldId id="262" r:id="rId7"/>
+    <p:sldId id="259" r:id="rId8"/>
   </p:sldIdLst>
   <p:sldSz cx="12192000" cy="6858000"/>
   <p:notesSz cx="6858000" cy="9144000"/>
@@ -107,6 +111,25 @@
     </a:lvl9pPr>
   </p:defaultTextStyle>
   <p:extLst>
+    <p:ext uri="{521415D9-36F7-43E2-AB2F-B90AF26B5E84}">
+      <p14:sectionLst xmlns:p14="http://schemas.microsoft.com/office/powerpoint/2010/main">
+        <p14:section name="Default Section" id="{9D32652A-11E5-4030-9229-7D20AF6CC797}">
+          <p14:sldIdLst>
+            <p14:sldId id="256"/>
+            <p14:sldId id="257"/>
+            <p14:sldId id="258"/>
+            <p14:sldId id="261"/>
+            <p14:sldId id="260"/>
+            <p14:sldId id="262"/>
+          </p14:sldIdLst>
+        </p14:section>
+        <p14:section name="shapes version" id="{95BD8D15-447B-4C76-99EE-FA60D2C0A7FE}">
+          <p14:sldIdLst>
+            <p14:sldId id="259"/>
+          </p14:sldIdLst>
+        </p14:section>
+      </p14:sectionLst>
+    </p:ext>
     <p:ext uri="{EFAFB233-063F-42B5-8137-9DF3F51BA10A}">
       <p15:sldGuideLst xmlns:p15="http://schemas.microsoft.com/office/powerpoint/2012/main"/>
     </p:ext>
@@ -245,7 +268,7 @@
           <a:p>
             <a:fld id="{F91AB40E-11DA-42CE-93B8-E3535B8A82AA}" type="datetimeFigureOut">
               <a:rPr lang="en-US" smtClean="0"/>
-              <a:t>3/31/2017</a:t>
+              <a:t>4/2/2017</a:t>
             </a:fld>
             <a:endParaRPr lang="en-US"/>
           </a:p>
@@ -415,7 +438,7 @@
           <a:p>
             <a:fld id="{F91AB40E-11DA-42CE-93B8-E3535B8A82AA}" type="datetimeFigureOut">
               <a:rPr lang="en-US" smtClean="0"/>
-              <a:t>3/31/2017</a:t>
+              <a:t>4/2/2017</a:t>
             </a:fld>
             <a:endParaRPr lang="en-US"/>
           </a:p>
@@ -595,7 +618,7 @@
           <a:p>
             <a:fld id="{F91AB40E-11DA-42CE-93B8-E3535B8A82AA}" type="datetimeFigureOut">
               <a:rPr lang="en-US" smtClean="0"/>
-              <a:t>3/31/2017</a:t>
+              <a:t>4/2/2017</a:t>
             </a:fld>
             <a:endParaRPr lang="en-US"/>
           </a:p>
@@ -765,7 +788,7 @@
           <a:p>
             <a:fld id="{F91AB40E-11DA-42CE-93B8-E3535B8A82AA}" type="datetimeFigureOut">
               <a:rPr lang="en-US" smtClean="0"/>
-              <a:t>3/31/2017</a:t>
+              <a:t>4/2/2017</a:t>
             </a:fld>
             <a:endParaRPr lang="en-US"/>
           </a:p>
@@ -1011,7 +1034,7 @@
           <a:p>
             <a:fld id="{F91AB40E-11DA-42CE-93B8-E3535B8A82AA}" type="datetimeFigureOut">
               <a:rPr lang="en-US" smtClean="0"/>
-              <a:t>3/31/2017</a:t>
+              <a:t>4/2/2017</a:t>
             </a:fld>
             <a:endParaRPr lang="en-US"/>
           </a:p>
@@ -1243,7 +1266,7 @@
           <a:p>
             <a:fld id="{F91AB40E-11DA-42CE-93B8-E3535B8A82AA}" type="datetimeFigureOut">
               <a:rPr lang="en-US" smtClean="0"/>
-              <a:t>3/31/2017</a:t>
+              <a:t>4/2/2017</a:t>
             </a:fld>
             <a:endParaRPr lang="en-US"/>
           </a:p>
@@ -1610,7 +1633,7 @@
           <a:p>
             <a:fld id="{F91AB40E-11DA-42CE-93B8-E3535B8A82AA}" type="datetimeFigureOut">
               <a:rPr lang="en-US" smtClean="0"/>
-              <a:t>3/31/2017</a:t>
+              <a:t>4/2/2017</a:t>
             </a:fld>
             <a:endParaRPr lang="en-US"/>
           </a:p>
@@ -1728,7 +1751,7 @@
           <a:p>
             <a:fld id="{F91AB40E-11DA-42CE-93B8-E3535B8A82AA}" type="datetimeFigureOut">
               <a:rPr lang="en-US" smtClean="0"/>
-              <a:t>3/31/2017</a:t>
+              <a:t>4/2/2017</a:t>
             </a:fld>
             <a:endParaRPr lang="en-US"/>
           </a:p>
@@ -1823,7 +1846,7 @@
           <a:p>
             <a:fld id="{F91AB40E-11DA-42CE-93B8-E3535B8A82AA}" type="datetimeFigureOut">
               <a:rPr lang="en-US" smtClean="0"/>
-              <a:t>3/31/2017</a:t>
+              <a:t>4/2/2017</a:t>
             </a:fld>
             <a:endParaRPr lang="en-US"/>
           </a:p>
@@ -2100,7 +2123,7 @@
           <a:p>
             <a:fld id="{F91AB40E-11DA-42CE-93B8-E3535B8A82AA}" type="datetimeFigureOut">
               <a:rPr lang="en-US" smtClean="0"/>
-              <a:t>3/31/2017</a:t>
+              <a:t>4/2/2017</a:t>
             </a:fld>
             <a:endParaRPr lang="en-US"/>
           </a:p>
@@ -2353,7 +2376,7 @@
           <a:p>
             <a:fld id="{F91AB40E-11DA-42CE-93B8-E3535B8A82AA}" type="datetimeFigureOut">
               <a:rPr lang="en-US" smtClean="0"/>
-              <a:t>3/31/2017</a:t>
+              <a:t>4/2/2017</a:t>
             </a:fld>
             <a:endParaRPr lang="en-US"/>
           </a:p>
@@ -2566,7 +2589,7 @@
           <a:p>
             <a:fld id="{F91AB40E-11DA-42CE-93B8-E3535B8A82AA}" type="datetimeFigureOut">
               <a:rPr lang="en-US" smtClean="0"/>
-              <a:t>3/31/2017</a:t>
+              <a:t>4/2/2017</a:t>
             </a:fld>
             <a:endParaRPr lang="en-US"/>
           </a:p>
@@ -5592,6 +5615,2404 @@
 </p:sld>
 </file>
 
+<file path=ppt/slides/slide4.xml><?xml version="1.0" encoding="utf-8"?>
+<p:sld xmlns:a="http://schemas.openxmlformats.org/drawingml/2006/main" xmlns:r="http://schemas.openxmlformats.org/officeDocument/2006/relationships" xmlns:p="http://schemas.openxmlformats.org/presentationml/2006/main">
+  <p:cSld>
+    <p:spTree>
+      <p:nvGrpSpPr>
+        <p:cNvPr id="1" name=""/>
+        <p:cNvGrpSpPr/>
+        <p:nvPr/>
+      </p:nvGrpSpPr>
+      <p:grpSpPr>
+        <a:xfrm>
+          <a:off x="0" y="0"/>
+          <a:ext cx="0" cy="0"/>
+          <a:chOff x="0" y="0"/>
+          <a:chExt cx="0" cy="0"/>
+        </a:xfrm>
+      </p:grpSpPr>
+      <p:pic>
+        <p:nvPicPr>
+          <p:cNvPr id="4" name="Content Placeholder 3"/>
+          <p:cNvPicPr>
+            <a:picLocks noGrp="1" noChangeAspect="1"/>
+          </p:cNvPicPr>
+          <p:nvPr>
+            <p:ph idx="1"/>
+          </p:nvPr>
+        </p:nvPicPr>
+        <p:blipFill>
+          <a:blip r:embed="rId2"/>
+          <a:stretch>
+            <a:fillRect/>
+          </a:stretch>
+        </p:blipFill>
+        <p:spPr>
+          <a:xfrm>
+            <a:off x="866073" y="1009650"/>
+            <a:ext cx="6690937" cy="4711760"/>
+          </a:xfrm>
+          <a:prstGeom prst="rect">
+            <a:avLst/>
+          </a:prstGeom>
+        </p:spPr>
+      </p:pic>
+      <p:pic>
+        <p:nvPicPr>
+          <p:cNvPr id="5" name="Picture 4"/>
+          <p:cNvPicPr>
+            <a:picLocks noChangeAspect="1"/>
+          </p:cNvPicPr>
+          <p:nvPr/>
+        </p:nvPicPr>
+        <p:blipFill>
+          <a:blip r:embed="rId3"/>
+          <a:stretch>
+            <a:fillRect/>
+          </a:stretch>
+        </p:blipFill>
+        <p:spPr>
+          <a:xfrm>
+            <a:off x="8099976" y="2331640"/>
+            <a:ext cx="4000500" cy="2943225"/>
+          </a:xfrm>
+          <a:prstGeom prst="rect">
+            <a:avLst/>
+          </a:prstGeom>
+        </p:spPr>
+      </p:pic>
+      <p:sp>
+        <p:nvSpPr>
+          <p:cNvPr id="6" name="TextBox 5"/>
+          <p:cNvSpPr txBox="1"/>
+          <p:nvPr/>
+        </p:nvSpPr>
+        <p:spPr>
+          <a:xfrm>
+            <a:off x="8572500" y="1104900"/>
+            <a:ext cx="1971675" cy="646331"/>
+          </a:xfrm>
+          <a:prstGeom prst="rect">
+            <a:avLst/>
+          </a:prstGeom>
+          <a:noFill/>
+        </p:spPr>
+        <p:txBody>
+          <a:bodyPr wrap="square" rtlCol="0">
+            <a:spAutoFit/>
+          </a:bodyPr>
+          <a:lstStyle/>
+          <a:p>
+            <a:r>
+              <a:rPr lang="en-US" dirty="0" smtClean="0"/>
+              <a:t>Stress sensing resistor</a:t>
+            </a:r>
+            <a:endParaRPr lang="en-US" dirty="0"/>
+          </a:p>
+        </p:txBody>
+      </p:sp>
+    </p:spTree>
+    <p:extLst>
+      <p:ext uri="{BB962C8B-B14F-4D97-AF65-F5344CB8AC3E}">
+        <p14:creationId xmlns:p14="http://schemas.microsoft.com/office/powerpoint/2010/main" val="1973460988"/>
+      </p:ext>
+    </p:extLst>
+  </p:cSld>
+  <p:clrMapOvr>
+    <a:masterClrMapping/>
+  </p:clrMapOvr>
+</p:sld>
+</file>
+
+<file path=ppt/slides/slide5.xml><?xml version="1.0" encoding="utf-8"?>
+<p:sld xmlns:a="http://schemas.openxmlformats.org/drawingml/2006/main" xmlns:r="http://schemas.openxmlformats.org/officeDocument/2006/relationships" xmlns:p="http://schemas.openxmlformats.org/presentationml/2006/main">
+  <p:cSld>
+    <p:spTree>
+      <p:nvGrpSpPr>
+        <p:cNvPr id="1" name=""/>
+        <p:cNvGrpSpPr/>
+        <p:nvPr/>
+      </p:nvGrpSpPr>
+      <p:grpSpPr>
+        <a:xfrm>
+          <a:off x="0" y="0"/>
+          <a:ext cx="0" cy="0"/>
+          <a:chOff x="0" y="0"/>
+          <a:chExt cx="0" cy="0"/>
+        </a:xfrm>
+      </p:grpSpPr>
+      <p:pic>
+        <p:nvPicPr>
+          <p:cNvPr id="6" name="Content Placeholder 5"/>
+          <p:cNvPicPr>
+            <a:picLocks noGrp="1" noChangeAspect="1"/>
+          </p:cNvPicPr>
+          <p:nvPr>
+            <p:ph idx="1"/>
+          </p:nvPr>
+        </p:nvPicPr>
+        <p:blipFill rotWithShape="1">
+          <a:blip r:embed="rId2">
+            <a:extLst>
+              <a:ext uri="{28A0092B-C50C-407E-A947-70E740481C1C}">
+                <a14:useLocalDpi xmlns:a14="http://schemas.microsoft.com/office/drawing/2010/main" val="0"/>
+              </a:ext>
+            </a:extLst>
+          </a:blip>
+          <a:srcRect l="16875" t="35980" r="23360" b="19910"/>
+          <a:stretch/>
+        </p:blipFill>
+        <p:spPr>
+          <a:xfrm>
+            <a:off x="1915885" y="3416682"/>
+            <a:ext cx="8551112" cy="3549191"/>
+          </a:xfrm>
+        </p:spPr>
+      </p:pic>
+      <p:pic>
+        <p:nvPicPr>
+          <p:cNvPr id="7" name="Picture 6"/>
+          <p:cNvPicPr>
+            <a:picLocks noChangeAspect="1"/>
+          </p:cNvPicPr>
+          <p:nvPr/>
+        </p:nvPicPr>
+        <p:blipFill rotWithShape="1">
+          <a:blip r:embed="rId3"/>
+          <a:srcRect r="5559"/>
+          <a:stretch/>
+        </p:blipFill>
+        <p:spPr>
+          <a:xfrm rot="5400000">
+            <a:off x="3633199" y="-883448"/>
+            <a:ext cx="3162302" cy="5457008"/>
+          </a:xfrm>
+          <a:prstGeom prst="rect">
+            <a:avLst/>
+          </a:prstGeom>
+        </p:spPr>
+      </p:pic>
+      <p:sp>
+        <p:nvSpPr>
+          <p:cNvPr id="8" name="TextBox 7"/>
+          <p:cNvSpPr txBox="1"/>
+          <p:nvPr/>
+        </p:nvSpPr>
+        <p:spPr>
+          <a:xfrm>
+            <a:off x="1915885" y="3416682"/>
+            <a:ext cx="796835" cy="338554"/>
+          </a:xfrm>
+          <a:prstGeom prst="rect">
+            <a:avLst/>
+          </a:prstGeom>
+          <a:solidFill>
+            <a:schemeClr val="tx1"/>
+          </a:solidFill>
+        </p:spPr>
+        <p:txBody>
+          <a:bodyPr wrap="square" rtlCol="0">
+            <a:spAutoFit/>
+          </a:bodyPr>
+          <a:lstStyle/>
+          <a:p>
+            <a:r>
+              <a:rPr lang="en-US" sz="1600" dirty="0" smtClean="0">
+                <a:solidFill>
+                  <a:srgbClr val="FF0000"/>
+                </a:solidFill>
+              </a:rPr>
+              <a:t>FRONT</a:t>
+            </a:r>
+            <a:endParaRPr lang="en-US" sz="1600" dirty="0">
+              <a:solidFill>
+                <a:srgbClr val="FF0000"/>
+              </a:solidFill>
+            </a:endParaRPr>
+          </a:p>
+        </p:txBody>
+      </p:sp>
+      <p:sp>
+        <p:nvSpPr>
+          <p:cNvPr id="10" name="TextBox 9"/>
+          <p:cNvSpPr txBox="1"/>
+          <p:nvPr/>
+        </p:nvSpPr>
+        <p:spPr>
+          <a:xfrm>
+            <a:off x="1915885" y="6627319"/>
+            <a:ext cx="796835" cy="338554"/>
+          </a:xfrm>
+          <a:prstGeom prst="rect">
+            <a:avLst/>
+          </a:prstGeom>
+          <a:solidFill>
+            <a:schemeClr val="tx1"/>
+          </a:solidFill>
+        </p:spPr>
+        <p:txBody>
+          <a:bodyPr wrap="square" rtlCol="0">
+            <a:spAutoFit/>
+          </a:bodyPr>
+          <a:lstStyle/>
+          <a:p>
+            <a:r>
+              <a:rPr lang="en-US" sz="1600" dirty="0" smtClean="0">
+                <a:solidFill>
+                  <a:srgbClr val="FF0000"/>
+                </a:solidFill>
+              </a:rPr>
+              <a:t>BACK</a:t>
+            </a:r>
+            <a:endParaRPr lang="en-US" sz="1600" dirty="0">
+              <a:solidFill>
+                <a:srgbClr val="FF0000"/>
+              </a:solidFill>
+            </a:endParaRPr>
+          </a:p>
+        </p:txBody>
+      </p:sp>
+      <p:sp>
+        <p:nvSpPr>
+          <p:cNvPr id="11" name="TextBox 10"/>
+          <p:cNvSpPr txBox="1"/>
+          <p:nvPr/>
+        </p:nvSpPr>
+        <p:spPr>
+          <a:xfrm>
+            <a:off x="133350" y="1235367"/>
+            <a:ext cx="2821934" cy="1200329"/>
+          </a:xfrm>
+          <a:prstGeom prst="rect">
+            <a:avLst/>
+          </a:prstGeom>
+          <a:noFill/>
+        </p:spPr>
+        <p:txBody>
+          <a:bodyPr wrap="square" rtlCol="0">
+            <a:spAutoFit/>
+          </a:bodyPr>
+          <a:lstStyle/>
+          <a:p>
+            <a:r>
+              <a:rPr lang="en-US" b="1" i="1" dirty="0" smtClean="0"/>
+              <a:t>Analog</a:t>
+            </a:r>
+          </a:p>
+          <a:p>
+            <a:r>
+              <a:rPr lang="en-US" dirty="0" smtClean="0"/>
+              <a:t>Microphone</a:t>
+            </a:r>
+          </a:p>
+          <a:p>
+            <a:r>
+              <a:rPr lang="en-US" dirty="0" smtClean="0"/>
+              <a:t>Stress sensing</a:t>
+            </a:r>
+          </a:p>
+          <a:p>
+            <a:r>
+              <a:rPr lang="en-US" dirty="0" smtClean="0"/>
+              <a:t>Random seed pin (empty)</a:t>
+            </a:r>
+          </a:p>
+        </p:txBody>
+      </p:sp>
+      <p:sp>
+        <p:nvSpPr>
+          <p:cNvPr id="12" name="TextBox 11"/>
+          <p:cNvSpPr txBox="1"/>
+          <p:nvPr/>
+        </p:nvSpPr>
+        <p:spPr>
+          <a:xfrm>
+            <a:off x="3371671" y="4597129"/>
+            <a:ext cx="796835" cy="584775"/>
+          </a:xfrm>
+          <a:prstGeom prst="rect">
+            <a:avLst/>
+          </a:prstGeom>
+          <a:solidFill>
+            <a:schemeClr val="tx1"/>
+          </a:solidFill>
+        </p:spPr>
+        <p:txBody>
+          <a:bodyPr wrap="square" rtlCol="0">
+            <a:spAutoFit/>
+          </a:bodyPr>
+          <a:lstStyle/>
+          <a:p>
+            <a:pPr algn="ctr"/>
+            <a:r>
+              <a:rPr lang="en-US" sz="1600" dirty="0" smtClean="0">
+                <a:solidFill>
+                  <a:srgbClr val="FF0000"/>
+                </a:solidFill>
+              </a:rPr>
+              <a:t>SERVO 1</a:t>
+            </a:r>
+            <a:endParaRPr lang="en-US" sz="1600" dirty="0">
+              <a:solidFill>
+                <a:srgbClr val="FF0000"/>
+              </a:solidFill>
+            </a:endParaRPr>
+          </a:p>
+        </p:txBody>
+      </p:sp>
+      <p:sp>
+        <p:nvSpPr>
+          <p:cNvPr id="13" name="TextBox 12"/>
+          <p:cNvSpPr txBox="1"/>
+          <p:nvPr/>
+        </p:nvSpPr>
+        <p:spPr>
+          <a:xfrm>
+            <a:off x="8430262" y="4597128"/>
+            <a:ext cx="796835" cy="584775"/>
+          </a:xfrm>
+          <a:prstGeom prst="rect">
+            <a:avLst/>
+          </a:prstGeom>
+          <a:solidFill>
+            <a:schemeClr val="tx1"/>
+          </a:solidFill>
+        </p:spPr>
+        <p:txBody>
+          <a:bodyPr wrap="square" rtlCol="0">
+            <a:spAutoFit/>
+          </a:bodyPr>
+          <a:lstStyle/>
+          <a:p>
+            <a:pPr algn="ctr"/>
+            <a:r>
+              <a:rPr lang="en-US" sz="1600" dirty="0" smtClean="0">
+                <a:solidFill>
+                  <a:srgbClr val="FF0000"/>
+                </a:solidFill>
+              </a:rPr>
+              <a:t>SERVO 2</a:t>
+            </a:r>
+            <a:endParaRPr lang="en-US" sz="1600" dirty="0">
+              <a:solidFill>
+                <a:srgbClr val="FF0000"/>
+              </a:solidFill>
+            </a:endParaRPr>
+          </a:p>
+        </p:txBody>
+      </p:sp>
+      <p:sp>
+        <p:nvSpPr>
+          <p:cNvPr id="14" name="TextBox 13"/>
+          <p:cNvSpPr txBox="1"/>
+          <p:nvPr/>
+        </p:nvSpPr>
+        <p:spPr>
+          <a:xfrm>
+            <a:off x="133350" y="3733983"/>
+            <a:ext cx="2484120" cy="3139321"/>
+          </a:xfrm>
+          <a:prstGeom prst="rect">
+            <a:avLst/>
+          </a:prstGeom>
+          <a:noFill/>
+        </p:spPr>
+        <p:txBody>
+          <a:bodyPr wrap="square" rtlCol="0">
+            <a:spAutoFit/>
+          </a:bodyPr>
+          <a:lstStyle/>
+          <a:p>
+            <a:r>
+              <a:rPr lang="en-US" b="1" i="1" dirty="0" smtClean="0"/>
+              <a:t>Power</a:t>
+            </a:r>
+            <a:endParaRPr lang="en-US" b="1" dirty="0" smtClean="0"/>
+          </a:p>
+          <a:p>
+            <a:r>
+              <a:rPr lang="en-US" dirty="0" smtClean="0">
+                <a:solidFill>
+                  <a:schemeClr val="accent1"/>
+                </a:solidFill>
+              </a:rPr>
+              <a:t>Batt  </a:t>
+            </a:r>
+            <a:r>
+              <a:rPr lang="en-US" dirty="0" smtClean="0">
+                <a:solidFill>
+                  <a:schemeClr val="accent2"/>
+                </a:solidFill>
+              </a:rPr>
+              <a:t>3.3v pin</a:t>
+            </a:r>
+          </a:p>
+          <a:p>
+            <a:r>
+              <a:rPr lang="en-US" dirty="0" smtClean="0">
+                <a:solidFill>
+                  <a:schemeClr val="accent2"/>
+                </a:solidFill>
+              </a:rPr>
+              <a:t>Microphone</a:t>
+            </a:r>
+          </a:p>
+          <a:p>
+            <a:r>
+              <a:rPr lang="en-US" dirty="0" smtClean="0">
+                <a:solidFill>
+                  <a:schemeClr val="accent1"/>
+                </a:solidFill>
+              </a:rPr>
+              <a:t>Servo 1</a:t>
+            </a:r>
+          </a:p>
+          <a:p>
+            <a:r>
+              <a:rPr lang="en-US" dirty="0" smtClean="0">
+                <a:solidFill>
+                  <a:schemeClr val="accent1"/>
+                </a:solidFill>
+              </a:rPr>
+              <a:t>Servo 2</a:t>
+            </a:r>
+          </a:p>
+          <a:p>
+            <a:endParaRPr lang="en-US" dirty="0" smtClean="0"/>
+          </a:p>
+          <a:p>
+            <a:r>
+              <a:rPr lang="en-US" b="1" i="1" dirty="0" smtClean="0"/>
+              <a:t>Gnd</a:t>
+            </a:r>
+            <a:endParaRPr lang="en-US" b="1" i="1" dirty="0"/>
+          </a:p>
+          <a:p>
+            <a:r>
+              <a:rPr lang="en-US" dirty="0" smtClean="0"/>
+              <a:t>Stress sensing</a:t>
+            </a:r>
+          </a:p>
+          <a:p>
+            <a:r>
+              <a:rPr lang="en-US" dirty="0" smtClean="0"/>
+              <a:t>Servo 1</a:t>
+            </a:r>
+          </a:p>
+          <a:p>
+            <a:r>
+              <a:rPr lang="en-US" dirty="0" smtClean="0"/>
+              <a:t>Servo 2</a:t>
+            </a:r>
+          </a:p>
+          <a:p>
+            <a:r>
+              <a:rPr lang="en-US" dirty="0" smtClean="0"/>
+              <a:t>Microphone</a:t>
+            </a:r>
+          </a:p>
+        </p:txBody>
+      </p:sp>
+      <p:sp>
+        <p:nvSpPr>
+          <p:cNvPr id="17" name="TextBox 16"/>
+          <p:cNvSpPr txBox="1"/>
+          <p:nvPr/>
+        </p:nvSpPr>
+        <p:spPr>
+          <a:xfrm>
+            <a:off x="276225" y="0"/>
+            <a:ext cx="2619375" cy="1077218"/>
+          </a:xfrm>
+          <a:prstGeom prst="rect">
+            <a:avLst/>
+          </a:prstGeom>
+          <a:noFill/>
+        </p:spPr>
+        <p:txBody>
+          <a:bodyPr wrap="square" rtlCol="0">
+            <a:spAutoFit/>
+          </a:bodyPr>
+          <a:lstStyle/>
+          <a:p>
+            <a:r>
+              <a:rPr lang="en-US" sz="3200" dirty="0" smtClean="0"/>
+              <a:t>CLEAN SLIDE DON’T EDIT!!</a:t>
+            </a:r>
+            <a:endParaRPr lang="en-US" sz="3200" dirty="0"/>
+          </a:p>
+        </p:txBody>
+      </p:sp>
+      <p:sp>
+        <p:nvSpPr>
+          <p:cNvPr id="19" name="Rectangle 18"/>
+          <p:cNvSpPr/>
+          <p:nvPr/>
+        </p:nvSpPr>
+        <p:spPr>
+          <a:xfrm>
+            <a:off x="7747696" y="421640"/>
+            <a:ext cx="2028634" cy="2835657"/>
+          </a:xfrm>
+          <a:prstGeom prst="rect">
+            <a:avLst/>
+          </a:prstGeom>
+        </p:spPr>
+        <p:style>
+          <a:lnRef idx="2">
+            <a:schemeClr val="accent1">
+              <a:shade val="50000"/>
+            </a:schemeClr>
+          </a:lnRef>
+          <a:fillRef idx="1">
+            <a:schemeClr val="accent1"/>
+          </a:fillRef>
+          <a:effectRef idx="0">
+            <a:schemeClr val="accent1"/>
+          </a:effectRef>
+          <a:fontRef idx="minor">
+            <a:schemeClr val="lt1"/>
+          </a:fontRef>
+        </p:style>
+        <p:txBody>
+          <a:bodyPr rtlCol="0" anchor="ctr"/>
+          <a:lstStyle/>
+          <a:p>
+            <a:pPr algn="ctr"/>
+            <a:r>
+              <a:rPr lang="en-US" dirty="0" smtClean="0"/>
+              <a:t>Microphone</a:t>
+            </a:r>
+            <a:endParaRPr lang="en-US" dirty="0"/>
+          </a:p>
+        </p:txBody>
+      </p:sp>
+    </p:spTree>
+    <p:extLst>
+      <p:ext uri="{BB962C8B-B14F-4D97-AF65-F5344CB8AC3E}">
+        <p14:creationId xmlns:p14="http://schemas.microsoft.com/office/powerpoint/2010/main" val="2748645761"/>
+      </p:ext>
+    </p:extLst>
+  </p:cSld>
+  <p:clrMapOvr>
+    <a:masterClrMapping/>
+  </p:clrMapOvr>
+</p:sld>
+</file>
+
+<file path=ppt/slides/slide6.xml><?xml version="1.0" encoding="utf-8"?>
+<p:sld xmlns:a="http://schemas.openxmlformats.org/drawingml/2006/main" xmlns:r="http://schemas.openxmlformats.org/officeDocument/2006/relationships" xmlns:p="http://schemas.openxmlformats.org/presentationml/2006/main">
+  <p:cSld>
+    <p:spTree>
+      <p:nvGrpSpPr>
+        <p:cNvPr id="1" name=""/>
+        <p:cNvGrpSpPr/>
+        <p:nvPr/>
+      </p:nvGrpSpPr>
+      <p:grpSpPr>
+        <a:xfrm>
+          <a:off x="0" y="0"/>
+          <a:ext cx="0" cy="0"/>
+          <a:chOff x="0" y="0"/>
+          <a:chExt cx="0" cy="0"/>
+        </a:xfrm>
+      </p:grpSpPr>
+      <p:pic>
+        <p:nvPicPr>
+          <p:cNvPr id="6" name="Content Placeholder 5"/>
+          <p:cNvPicPr>
+            <a:picLocks noGrp="1" noChangeAspect="1"/>
+          </p:cNvPicPr>
+          <p:nvPr>
+            <p:ph idx="1"/>
+          </p:nvPr>
+        </p:nvPicPr>
+        <p:blipFill rotWithShape="1">
+          <a:blip r:embed="rId2">
+            <a:extLst>
+              <a:ext uri="{28A0092B-C50C-407E-A947-70E740481C1C}">
+                <a14:useLocalDpi xmlns:a14="http://schemas.microsoft.com/office/drawing/2010/main" val="0"/>
+              </a:ext>
+            </a:extLst>
+          </a:blip>
+          <a:srcRect l="16875" t="35980" r="23360" b="19910"/>
+          <a:stretch/>
+        </p:blipFill>
+        <p:spPr>
+          <a:xfrm>
+            <a:off x="1915885" y="3416682"/>
+            <a:ext cx="8551112" cy="3549191"/>
+          </a:xfrm>
+        </p:spPr>
+      </p:pic>
+      <p:pic>
+        <p:nvPicPr>
+          <p:cNvPr id="7" name="Picture 6"/>
+          <p:cNvPicPr>
+            <a:picLocks noChangeAspect="1"/>
+          </p:cNvPicPr>
+          <p:nvPr/>
+        </p:nvPicPr>
+        <p:blipFill rotWithShape="1">
+          <a:blip r:embed="rId3"/>
+          <a:srcRect r="5559"/>
+          <a:stretch/>
+        </p:blipFill>
+        <p:spPr>
+          <a:xfrm rot="5400000">
+            <a:off x="3662961" y="-807065"/>
+            <a:ext cx="3162302" cy="5457008"/>
+          </a:xfrm>
+          <a:prstGeom prst="rect">
+            <a:avLst/>
+          </a:prstGeom>
+        </p:spPr>
+      </p:pic>
+      <p:sp>
+        <p:nvSpPr>
+          <p:cNvPr id="8" name="TextBox 7"/>
+          <p:cNvSpPr txBox="1"/>
+          <p:nvPr/>
+        </p:nvSpPr>
+        <p:spPr>
+          <a:xfrm>
+            <a:off x="1915885" y="3416682"/>
+            <a:ext cx="796835" cy="338554"/>
+          </a:xfrm>
+          <a:prstGeom prst="rect">
+            <a:avLst/>
+          </a:prstGeom>
+          <a:solidFill>
+            <a:schemeClr val="tx1"/>
+          </a:solidFill>
+        </p:spPr>
+        <p:txBody>
+          <a:bodyPr wrap="square" rtlCol="0">
+            <a:spAutoFit/>
+          </a:bodyPr>
+          <a:lstStyle/>
+          <a:p>
+            <a:r>
+              <a:rPr lang="en-US" sz="1600" dirty="0" smtClean="0">
+                <a:solidFill>
+                  <a:srgbClr val="FF0000"/>
+                </a:solidFill>
+              </a:rPr>
+              <a:t>FRONT</a:t>
+            </a:r>
+            <a:endParaRPr lang="en-US" sz="1600" dirty="0">
+              <a:solidFill>
+                <a:srgbClr val="FF0000"/>
+              </a:solidFill>
+            </a:endParaRPr>
+          </a:p>
+        </p:txBody>
+      </p:sp>
+      <p:sp>
+        <p:nvSpPr>
+          <p:cNvPr id="10" name="TextBox 9"/>
+          <p:cNvSpPr txBox="1"/>
+          <p:nvPr/>
+        </p:nvSpPr>
+        <p:spPr>
+          <a:xfrm>
+            <a:off x="1915885" y="6627319"/>
+            <a:ext cx="796835" cy="338554"/>
+          </a:xfrm>
+          <a:prstGeom prst="rect">
+            <a:avLst/>
+          </a:prstGeom>
+          <a:solidFill>
+            <a:schemeClr val="tx1"/>
+          </a:solidFill>
+        </p:spPr>
+        <p:txBody>
+          <a:bodyPr wrap="square" rtlCol="0">
+            <a:spAutoFit/>
+          </a:bodyPr>
+          <a:lstStyle/>
+          <a:p>
+            <a:r>
+              <a:rPr lang="en-US" sz="1600" dirty="0" smtClean="0">
+                <a:solidFill>
+                  <a:srgbClr val="FF0000"/>
+                </a:solidFill>
+              </a:rPr>
+              <a:t>BACK</a:t>
+            </a:r>
+            <a:endParaRPr lang="en-US" sz="1600" dirty="0">
+              <a:solidFill>
+                <a:srgbClr val="FF0000"/>
+              </a:solidFill>
+            </a:endParaRPr>
+          </a:p>
+        </p:txBody>
+      </p:sp>
+      <p:sp>
+        <p:nvSpPr>
+          <p:cNvPr id="11" name="TextBox 10"/>
+          <p:cNvSpPr txBox="1"/>
+          <p:nvPr/>
+        </p:nvSpPr>
+        <p:spPr>
+          <a:xfrm>
+            <a:off x="133350" y="1235367"/>
+            <a:ext cx="2821934" cy="1200329"/>
+          </a:xfrm>
+          <a:prstGeom prst="rect">
+            <a:avLst/>
+          </a:prstGeom>
+          <a:noFill/>
+        </p:spPr>
+        <p:txBody>
+          <a:bodyPr wrap="square" rtlCol="0">
+            <a:spAutoFit/>
+          </a:bodyPr>
+          <a:lstStyle/>
+          <a:p>
+            <a:r>
+              <a:rPr lang="en-US" b="1" i="1" dirty="0" smtClean="0"/>
+              <a:t>Analog</a:t>
+            </a:r>
+          </a:p>
+          <a:p>
+            <a:r>
+              <a:rPr lang="en-US" dirty="0" smtClean="0"/>
+              <a:t>Microphone</a:t>
+            </a:r>
+          </a:p>
+          <a:p>
+            <a:r>
+              <a:rPr lang="en-US" dirty="0" smtClean="0"/>
+              <a:t>Stress sensing</a:t>
+            </a:r>
+          </a:p>
+          <a:p>
+            <a:r>
+              <a:rPr lang="en-US" dirty="0" smtClean="0"/>
+              <a:t>Random seed pin (empty)</a:t>
+            </a:r>
+          </a:p>
+        </p:txBody>
+      </p:sp>
+      <p:sp>
+        <p:nvSpPr>
+          <p:cNvPr id="12" name="TextBox 11"/>
+          <p:cNvSpPr txBox="1"/>
+          <p:nvPr/>
+        </p:nvSpPr>
+        <p:spPr>
+          <a:xfrm>
+            <a:off x="3371671" y="4597129"/>
+            <a:ext cx="796835" cy="584775"/>
+          </a:xfrm>
+          <a:prstGeom prst="rect">
+            <a:avLst/>
+          </a:prstGeom>
+          <a:solidFill>
+            <a:schemeClr val="tx1"/>
+          </a:solidFill>
+        </p:spPr>
+        <p:txBody>
+          <a:bodyPr wrap="square" rtlCol="0">
+            <a:spAutoFit/>
+          </a:bodyPr>
+          <a:lstStyle/>
+          <a:p>
+            <a:pPr algn="ctr"/>
+            <a:r>
+              <a:rPr lang="en-US" sz="1600" dirty="0" smtClean="0">
+                <a:solidFill>
+                  <a:srgbClr val="FF0000"/>
+                </a:solidFill>
+              </a:rPr>
+              <a:t>SERVO 1</a:t>
+            </a:r>
+            <a:endParaRPr lang="en-US" sz="1600" dirty="0">
+              <a:solidFill>
+                <a:srgbClr val="FF0000"/>
+              </a:solidFill>
+            </a:endParaRPr>
+          </a:p>
+        </p:txBody>
+      </p:sp>
+      <p:sp>
+        <p:nvSpPr>
+          <p:cNvPr id="13" name="TextBox 12"/>
+          <p:cNvSpPr txBox="1"/>
+          <p:nvPr/>
+        </p:nvSpPr>
+        <p:spPr>
+          <a:xfrm>
+            <a:off x="8430262" y="4597128"/>
+            <a:ext cx="796835" cy="584775"/>
+          </a:xfrm>
+          <a:prstGeom prst="rect">
+            <a:avLst/>
+          </a:prstGeom>
+          <a:solidFill>
+            <a:schemeClr val="tx1"/>
+          </a:solidFill>
+        </p:spPr>
+        <p:txBody>
+          <a:bodyPr wrap="square" rtlCol="0">
+            <a:spAutoFit/>
+          </a:bodyPr>
+          <a:lstStyle/>
+          <a:p>
+            <a:pPr algn="ctr"/>
+            <a:r>
+              <a:rPr lang="en-US" sz="1600" dirty="0" smtClean="0">
+                <a:solidFill>
+                  <a:srgbClr val="FF0000"/>
+                </a:solidFill>
+              </a:rPr>
+              <a:t>SERVO 2</a:t>
+            </a:r>
+            <a:endParaRPr lang="en-US" sz="1600" dirty="0">
+              <a:solidFill>
+                <a:srgbClr val="FF0000"/>
+              </a:solidFill>
+            </a:endParaRPr>
+          </a:p>
+        </p:txBody>
+      </p:sp>
+      <p:sp>
+        <p:nvSpPr>
+          <p:cNvPr id="14" name="TextBox 13"/>
+          <p:cNvSpPr txBox="1"/>
+          <p:nvPr/>
+        </p:nvSpPr>
+        <p:spPr>
+          <a:xfrm>
+            <a:off x="133350" y="3733983"/>
+            <a:ext cx="2484120" cy="3139321"/>
+          </a:xfrm>
+          <a:prstGeom prst="rect">
+            <a:avLst/>
+          </a:prstGeom>
+          <a:noFill/>
+        </p:spPr>
+        <p:txBody>
+          <a:bodyPr wrap="square" rtlCol="0">
+            <a:spAutoFit/>
+          </a:bodyPr>
+          <a:lstStyle/>
+          <a:p>
+            <a:r>
+              <a:rPr lang="en-US" b="1" i="1" dirty="0" smtClean="0"/>
+              <a:t>Power</a:t>
+            </a:r>
+            <a:endParaRPr lang="en-US" b="1" dirty="0" smtClean="0"/>
+          </a:p>
+          <a:p>
+            <a:r>
+              <a:rPr lang="en-US" dirty="0" smtClean="0">
+                <a:solidFill>
+                  <a:schemeClr val="accent1"/>
+                </a:solidFill>
+              </a:rPr>
+              <a:t>Batt  </a:t>
+            </a:r>
+            <a:r>
+              <a:rPr lang="en-US" dirty="0" smtClean="0">
+                <a:solidFill>
+                  <a:schemeClr val="accent2"/>
+                </a:solidFill>
+              </a:rPr>
+              <a:t>3.3v pin</a:t>
+            </a:r>
+          </a:p>
+          <a:p>
+            <a:r>
+              <a:rPr lang="en-US" dirty="0" smtClean="0">
+                <a:solidFill>
+                  <a:schemeClr val="accent2"/>
+                </a:solidFill>
+              </a:rPr>
+              <a:t>Microphone</a:t>
+            </a:r>
+          </a:p>
+          <a:p>
+            <a:r>
+              <a:rPr lang="en-US" dirty="0" smtClean="0">
+                <a:solidFill>
+                  <a:schemeClr val="accent1"/>
+                </a:solidFill>
+              </a:rPr>
+              <a:t>Servo 1</a:t>
+            </a:r>
+          </a:p>
+          <a:p>
+            <a:r>
+              <a:rPr lang="en-US" dirty="0" smtClean="0">
+                <a:solidFill>
+                  <a:schemeClr val="accent1"/>
+                </a:solidFill>
+              </a:rPr>
+              <a:t>Servo 2</a:t>
+            </a:r>
+          </a:p>
+          <a:p>
+            <a:endParaRPr lang="en-US" dirty="0" smtClean="0"/>
+          </a:p>
+          <a:p>
+            <a:r>
+              <a:rPr lang="en-US" b="1" i="1" dirty="0" smtClean="0"/>
+              <a:t>Gnd</a:t>
+            </a:r>
+            <a:endParaRPr lang="en-US" b="1" i="1" dirty="0"/>
+          </a:p>
+          <a:p>
+            <a:r>
+              <a:rPr lang="en-US" dirty="0" smtClean="0"/>
+              <a:t>Stress sensing</a:t>
+            </a:r>
+          </a:p>
+          <a:p>
+            <a:r>
+              <a:rPr lang="en-US" dirty="0" smtClean="0"/>
+              <a:t>Servo 1</a:t>
+            </a:r>
+          </a:p>
+          <a:p>
+            <a:r>
+              <a:rPr lang="en-US" dirty="0" smtClean="0"/>
+              <a:t>Servo 2</a:t>
+            </a:r>
+          </a:p>
+          <a:p>
+            <a:r>
+              <a:rPr lang="en-US" dirty="0" smtClean="0"/>
+              <a:t>Microphone</a:t>
+            </a:r>
+          </a:p>
+        </p:txBody>
+      </p:sp>
+      <p:sp>
+        <p:nvSpPr>
+          <p:cNvPr id="3" name="TextBox 2"/>
+          <p:cNvSpPr txBox="1"/>
+          <p:nvPr/>
+        </p:nvSpPr>
+        <p:spPr>
+          <a:xfrm>
+            <a:off x="10076472" y="691148"/>
+            <a:ext cx="2628900" cy="2308324"/>
+          </a:xfrm>
+          <a:prstGeom prst="rect">
+            <a:avLst/>
+          </a:prstGeom>
+          <a:noFill/>
+        </p:spPr>
+        <p:txBody>
+          <a:bodyPr wrap="square" rtlCol="0">
+            <a:spAutoFit/>
+          </a:bodyPr>
+          <a:lstStyle/>
+          <a:p>
+            <a:r>
+              <a:rPr lang="en-US" dirty="0" smtClean="0"/>
+              <a:t>(a0/5) = servo1 sig</a:t>
+            </a:r>
+          </a:p>
+          <a:p>
+            <a:r>
+              <a:rPr lang="en-US" dirty="0" smtClean="0"/>
+              <a:t>(c0/3) = servo2 sig</a:t>
+            </a:r>
+          </a:p>
+          <a:p>
+            <a:endParaRPr lang="en-US" dirty="0" smtClean="0"/>
+          </a:p>
+          <a:p>
+            <a:r>
+              <a:rPr lang="en-US" dirty="0" smtClean="0"/>
+              <a:t>(h0/A3) = stress</a:t>
+            </a:r>
+          </a:p>
+          <a:p>
+            <a:r>
+              <a:rPr lang="en-US" dirty="0" smtClean="0"/>
+              <a:t>(g0/A2) = mic</a:t>
+            </a:r>
+          </a:p>
+          <a:p>
+            <a:r>
+              <a:rPr lang="en-US" dirty="0" smtClean="0"/>
+              <a:t>(e0/A0)=light1</a:t>
+            </a:r>
+          </a:p>
+          <a:p>
+            <a:r>
+              <a:rPr lang="en-US" dirty="0" smtClean="0"/>
+              <a:t>(f0/A1)=light2</a:t>
+            </a:r>
+          </a:p>
+          <a:p>
+            <a:endParaRPr lang="en-US" dirty="0" smtClean="0"/>
+          </a:p>
+        </p:txBody>
+      </p:sp>
+      <p:sp>
+        <p:nvSpPr>
+          <p:cNvPr id="4" name="Rectangle 3"/>
+          <p:cNvSpPr/>
+          <p:nvPr/>
+        </p:nvSpPr>
+        <p:spPr>
+          <a:xfrm>
+            <a:off x="5557068" y="5408648"/>
+            <a:ext cx="1526176" cy="346002"/>
+          </a:xfrm>
+          <a:prstGeom prst="rect">
+            <a:avLst/>
+          </a:prstGeom>
+          <a:solidFill>
+            <a:schemeClr val="tx1">
+              <a:alpha val="50000"/>
+            </a:schemeClr>
+          </a:solidFill>
+          <a:ln>
+            <a:noFill/>
+          </a:ln>
+        </p:spPr>
+        <p:style>
+          <a:lnRef idx="2">
+            <a:schemeClr val="accent1">
+              <a:shade val="50000"/>
+            </a:schemeClr>
+          </a:lnRef>
+          <a:fillRef idx="1">
+            <a:schemeClr val="accent1"/>
+          </a:fillRef>
+          <a:effectRef idx="0">
+            <a:schemeClr val="accent1"/>
+          </a:effectRef>
+          <a:fontRef idx="minor">
+            <a:schemeClr val="lt1"/>
+          </a:fontRef>
+        </p:style>
+        <p:txBody>
+          <a:bodyPr rtlCol="0" anchor="ctr"/>
+          <a:lstStyle/>
+          <a:p>
+            <a:pPr algn="ctr"/>
+            <a:r>
+              <a:rPr lang="en-US" dirty="0" smtClean="0"/>
+              <a:t>GND</a:t>
+            </a:r>
+            <a:endParaRPr lang="en-US" dirty="0"/>
+          </a:p>
+        </p:txBody>
+      </p:sp>
+      <p:sp>
+        <p:nvSpPr>
+          <p:cNvPr id="5" name="Rectangle 4"/>
+          <p:cNvSpPr/>
+          <p:nvPr/>
+        </p:nvSpPr>
+        <p:spPr>
+          <a:xfrm>
+            <a:off x="7814362" y="542926"/>
+            <a:ext cx="2028634" cy="2835657"/>
+          </a:xfrm>
+          <a:prstGeom prst="rect">
+            <a:avLst/>
+          </a:prstGeom>
+        </p:spPr>
+        <p:style>
+          <a:lnRef idx="2">
+            <a:schemeClr val="accent1">
+              <a:shade val="50000"/>
+            </a:schemeClr>
+          </a:lnRef>
+          <a:fillRef idx="1">
+            <a:schemeClr val="accent1"/>
+          </a:fillRef>
+          <a:effectRef idx="0">
+            <a:schemeClr val="accent1"/>
+          </a:effectRef>
+          <a:fontRef idx="minor">
+            <a:schemeClr val="lt1"/>
+          </a:fontRef>
+        </p:style>
+        <p:txBody>
+          <a:bodyPr rtlCol="0" anchor="ctr"/>
+          <a:lstStyle/>
+          <a:p>
+            <a:pPr algn="ctr"/>
+            <a:r>
+              <a:rPr lang="en-US" dirty="0" smtClean="0"/>
+              <a:t>Microphone</a:t>
+            </a:r>
+            <a:endParaRPr lang="en-US" dirty="0"/>
+          </a:p>
+        </p:txBody>
+      </p:sp>
+      <p:sp>
+        <p:nvSpPr>
+          <p:cNvPr id="19" name="Rectangle 18"/>
+          <p:cNvSpPr/>
+          <p:nvPr/>
+        </p:nvSpPr>
+        <p:spPr>
+          <a:xfrm rot="16200000">
+            <a:off x="5650657" y="4426178"/>
+            <a:ext cx="2457139" cy="361949"/>
+          </a:xfrm>
+          <a:prstGeom prst="rect">
+            <a:avLst/>
+          </a:prstGeom>
+          <a:solidFill>
+            <a:schemeClr val="tx1">
+              <a:alpha val="50000"/>
+            </a:schemeClr>
+          </a:solidFill>
+          <a:ln>
+            <a:noFill/>
+          </a:ln>
+        </p:spPr>
+        <p:style>
+          <a:lnRef idx="2">
+            <a:schemeClr val="accent1">
+              <a:shade val="50000"/>
+            </a:schemeClr>
+          </a:lnRef>
+          <a:fillRef idx="1">
+            <a:schemeClr val="accent1"/>
+          </a:fillRef>
+          <a:effectRef idx="0">
+            <a:schemeClr val="accent1"/>
+          </a:effectRef>
+          <a:fontRef idx="minor">
+            <a:schemeClr val="lt1"/>
+          </a:fontRef>
+        </p:style>
+        <p:txBody>
+          <a:bodyPr rtlCol="0" anchor="ctr"/>
+          <a:lstStyle/>
+          <a:p>
+            <a:pPr algn="ctr"/>
+            <a:r>
+              <a:rPr lang="en-US" dirty="0" smtClean="0"/>
+              <a:t>GND</a:t>
+            </a:r>
+            <a:endParaRPr lang="en-US" dirty="0"/>
+          </a:p>
+        </p:txBody>
+      </p:sp>
+      <p:sp>
+        <p:nvSpPr>
+          <p:cNvPr id="20" name="Rectangle 19"/>
+          <p:cNvSpPr/>
+          <p:nvPr/>
+        </p:nvSpPr>
+        <p:spPr>
+          <a:xfrm rot="5400000">
+            <a:off x="6066758" y="4806970"/>
+            <a:ext cx="2441008" cy="361949"/>
+          </a:xfrm>
+          <a:prstGeom prst="rect">
+            <a:avLst/>
+          </a:prstGeom>
+          <a:solidFill>
+            <a:srgbClr val="FF0000">
+              <a:alpha val="50000"/>
+            </a:srgbClr>
+          </a:solidFill>
+          <a:ln>
+            <a:noFill/>
+          </a:ln>
+        </p:spPr>
+        <p:style>
+          <a:lnRef idx="2">
+            <a:schemeClr val="accent1">
+              <a:shade val="50000"/>
+            </a:schemeClr>
+          </a:lnRef>
+          <a:fillRef idx="1">
+            <a:schemeClr val="accent1"/>
+          </a:fillRef>
+          <a:effectRef idx="0">
+            <a:schemeClr val="accent1"/>
+          </a:effectRef>
+          <a:fontRef idx="minor">
+            <a:schemeClr val="lt1"/>
+          </a:fontRef>
+        </p:style>
+        <p:txBody>
+          <a:bodyPr rtlCol="0" anchor="ctr"/>
+          <a:lstStyle/>
+          <a:p>
+            <a:pPr algn="ctr"/>
+            <a:r>
+              <a:rPr lang="en-US" dirty="0" smtClean="0"/>
+              <a:t>RAW</a:t>
+            </a:r>
+            <a:endParaRPr lang="en-US" dirty="0"/>
+          </a:p>
+        </p:txBody>
+      </p:sp>
+      <p:sp>
+        <p:nvSpPr>
+          <p:cNvPr id="21" name="Rectangle 20"/>
+          <p:cNvSpPr/>
+          <p:nvPr/>
+        </p:nvSpPr>
+        <p:spPr>
+          <a:xfrm>
+            <a:off x="6128635" y="5846499"/>
+            <a:ext cx="1139231" cy="361949"/>
+          </a:xfrm>
+          <a:prstGeom prst="rect">
+            <a:avLst/>
+          </a:prstGeom>
+          <a:solidFill>
+            <a:srgbClr val="FF0000">
+              <a:alpha val="50000"/>
+            </a:srgbClr>
+          </a:solidFill>
+          <a:ln>
+            <a:noFill/>
+          </a:ln>
+        </p:spPr>
+        <p:style>
+          <a:lnRef idx="2">
+            <a:schemeClr val="accent1">
+              <a:shade val="50000"/>
+            </a:schemeClr>
+          </a:lnRef>
+          <a:fillRef idx="1">
+            <a:schemeClr val="accent1"/>
+          </a:fillRef>
+          <a:effectRef idx="0">
+            <a:schemeClr val="accent1"/>
+          </a:effectRef>
+          <a:fontRef idx="minor">
+            <a:schemeClr val="lt1"/>
+          </a:fontRef>
+        </p:style>
+        <p:txBody>
+          <a:bodyPr rtlCol="0" anchor="ctr"/>
+          <a:lstStyle/>
+          <a:p>
+            <a:pPr algn="ctr"/>
+            <a:r>
+              <a:rPr lang="en-US" dirty="0" smtClean="0"/>
+              <a:t>RAW</a:t>
+            </a:r>
+            <a:endParaRPr lang="en-US" dirty="0"/>
+          </a:p>
+        </p:txBody>
+      </p:sp>
+    </p:spTree>
+    <p:extLst>
+      <p:ext uri="{BB962C8B-B14F-4D97-AF65-F5344CB8AC3E}">
+        <p14:creationId xmlns:p14="http://schemas.microsoft.com/office/powerpoint/2010/main" val="3061257763"/>
+      </p:ext>
+    </p:extLst>
+  </p:cSld>
+  <p:clrMapOvr>
+    <a:masterClrMapping/>
+  </p:clrMapOvr>
+</p:sld>
+</file>
+
+<file path=ppt/slides/slide7.xml><?xml version="1.0" encoding="utf-8"?>
+<p:sld xmlns:a="http://schemas.openxmlformats.org/drawingml/2006/main" xmlns:r="http://schemas.openxmlformats.org/officeDocument/2006/relationships" xmlns:p="http://schemas.openxmlformats.org/presentationml/2006/main">
+  <p:cSld>
+    <p:spTree>
+      <p:nvGrpSpPr>
+        <p:cNvPr id="1" name=""/>
+        <p:cNvGrpSpPr/>
+        <p:nvPr/>
+      </p:nvGrpSpPr>
+      <p:grpSpPr>
+        <a:xfrm>
+          <a:off x="0" y="0"/>
+          <a:ext cx="0" cy="0"/>
+          <a:chOff x="0" y="0"/>
+          <a:chExt cx="0" cy="0"/>
+        </a:xfrm>
+      </p:grpSpPr>
+      <p:pic>
+        <p:nvPicPr>
+          <p:cNvPr id="4" name="Content Placeholder 3"/>
+          <p:cNvPicPr>
+            <a:picLocks noGrp="1" noChangeAspect="1"/>
+          </p:cNvPicPr>
+          <p:nvPr>
+            <p:ph idx="1"/>
+          </p:nvPr>
+        </p:nvPicPr>
+        <p:blipFill>
+          <a:blip r:embed="rId2" cstate="print">
+            <a:extLst>
+              <a:ext uri="{28A0092B-C50C-407E-A947-70E740481C1C}">
+                <a14:useLocalDpi xmlns:a14="http://schemas.microsoft.com/office/drawing/2010/main" val="0"/>
+              </a:ext>
+            </a:extLst>
+          </a:blip>
+          <a:stretch>
+            <a:fillRect/>
+          </a:stretch>
+        </p:blipFill>
+        <p:spPr>
+          <a:xfrm>
+            <a:off x="1880075" y="1249885"/>
+            <a:ext cx="9135453" cy="5138691"/>
+          </a:xfrm>
+        </p:spPr>
+      </p:pic>
+      <p:grpSp>
+        <p:nvGrpSpPr>
+          <p:cNvPr id="37" name="Group 36"/>
+          <p:cNvGrpSpPr/>
+          <p:nvPr/>
+        </p:nvGrpSpPr>
+        <p:grpSpPr>
+          <a:xfrm>
+            <a:off x="3895827" y="3056705"/>
+            <a:ext cx="4830059" cy="369332"/>
+            <a:chOff x="3895827" y="3056705"/>
+            <a:chExt cx="4830059" cy="369332"/>
+          </a:xfrm>
+        </p:grpSpPr>
+        <p:sp>
+          <p:nvSpPr>
+            <p:cNvPr id="10" name="TextBox 9"/>
+            <p:cNvSpPr txBox="1"/>
+            <p:nvPr/>
+          </p:nvSpPr>
+          <p:spPr>
+            <a:xfrm>
+              <a:off x="3895827" y="3056705"/>
+              <a:ext cx="210312" cy="369332"/>
+            </a:xfrm>
+            <a:prstGeom prst="rect">
+              <a:avLst/>
+            </a:prstGeom>
+            <a:noFill/>
+          </p:spPr>
+          <p:txBody>
+            <a:bodyPr wrap="square" rtlCol="0">
+              <a:spAutoFit/>
+            </a:bodyPr>
+            <a:lstStyle/>
+            <a:p>
+              <a:pPr algn="ctr"/>
+              <a:r>
+                <a:rPr lang="en-US" dirty="0" smtClean="0"/>
+                <a:t>a</a:t>
+              </a:r>
+              <a:endParaRPr lang="en-US" dirty="0"/>
+            </a:p>
+          </p:txBody>
+        </p:sp>
+        <p:sp>
+          <p:nvSpPr>
+            <p:cNvPr id="11" name="TextBox 10"/>
+            <p:cNvSpPr txBox="1"/>
+            <p:nvPr/>
+          </p:nvSpPr>
+          <p:spPr>
+            <a:xfrm>
+              <a:off x="4152480" y="3056705"/>
+              <a:ext cx="210312" cy="369332"/>
+            </a:xfrm>
+            <a:prstGeom prst="rect">
+              <a:avLst/>
+            </a:prstGeom>
+            <a:noFill/>
+          </p:spPr>
+          <p:txBody>
+            <a:bodyPr wrap="square" rtlCol="0">
+              <a:spAutoFit/>
+            </a:bodyPr>
+            <a:lstStyle/>
+            <a:p>
+              <a:pPr algn="ctr"/>
+              <a:r>
+                <a:rPr lang="en-US" dirty="0"/>
+                <a:t>b</a:t>
+              </a:r>
+            </a:p>
+          </p:txBody>
+        </p:sp>
+        <p:sp>
+          <p:nvSpPr>
+            <p:cNvPr id="12" name="TextBox 11"/>
+            <p:cNvSpPr txBox="1"/>
+            <p:nvPr/>
+          </p:nvSpPr>
+          <p:spPr>
+            <a:xfrm>
+              <a:off x="8515574" y="3056705"/>
+              <a:ext cx="210312" cy="369332"/>
+            </a:xfrm>
+            <a:prstGeom prst="rect">
+              <a:avLst/>
+            </a:prstGeom>
+            <a:noFill/>
+          </p:spPr>
+          <p:txBody>
+            <a:bodyPr wrap="square" rtlCol="0">
+              <a:spAutoFit/>
+            </a:bodyPr>
+            <a:lstStyle/>
+            <a:p>
+              <a:pPr algn="ctr"/>
+              <a:r>
+                <a:rPr lang="en-US" dirty="0" smtClean="0"/>
+                <a:t>s</a:t>
+              </a:r>
+              <a:endParaRPr lang="en-US" dirty="0"/>
+            </a:p>
+          </p:txBody>
+        </p:sp>
+        <p:sp>
+          <p:nvSpPr>
+            <p:cNvPr id="13" name="TextBox 12"/>
+            <p:cNvSpPr txBox="1"/>
+            <p:nvPr/>
+          </p:nvSpPr>
+          <p:spPr>
+            <a:xfrm>
+              <a:off x="8258928" y="3056705"/>
+              <a:ext cx="210312" cy="369332"/>
+            </a:xfrm>
+            <a:prstGeom prst="rect">
+              <a:avLst/>
+            </a:prstGeom>
+            <a:noFill/>
+          </p:spPr>
+          <p:txBody>
+            <a:bodyPr wrap="square" rtlCol="0">
+              <a:spAutoFit/>
+            </a:bodyPr>
+            <a:lstStyle/>
+            <a:p>
+              <a:pPr algn="ctr"/>
+              <a:r>
+                <a:rPr lang="en-US" dirty="0" smtClean="0"/>
+                <a:t>r</a:t>
+              </a:r>
+              <a:endParaRPr lang="en-US" dirty="0"/>
+            </a:p>
+          </p:txBody>
+        </p:sp>
+        <p:sp>
+          <p:nvSpPr>
+            <p:cNvPr id="14" name="TextBox 13"/>
+            <p:cNvSpPr txBox="1"/>
+            <p:nvPr/>
+          </p:nvSpPr>
+          <p:spPr>
+            <a:xfrm>
+              <a:off x="8002275" y="3056705"/>
+              <a:ext cx="210312" cy="369332"/>
+            </a:xfrm>
+            <a:prstGeom prst="rect">
+              <a:avLst/>
+            </a:prstGeom>
+            <a:noFill/>
+          </p:spPr>
+          <p:txBody>
+            <a:bodyPr wrap="square" rtlCol="0">
+              <a:spAutoFit/>
+            </a:bodyPr>
+            <a:lstStyle/>
+            <a:p>
+              <a:pPr algn="ctr"/>
+              <a:r>
+                <a:rPr lang="en-US" dirty="0" smtClean="0"/>
+                <a:t>q</a:t>
+              </a:r>
+              <a:endParaRPr lang="en-US" dirty="0"/>
+            </a:p>
+          </p:txBody>
+        </p:sp>
+        <p:sp>
+          <p:nvSpPr>
+            <p:cNvPr id="15" name="TextBox 14"/>
+            <p:cNvSpPr txBox="1"/>
+            <p:nvPr/>
+          </p:nvSpPr>
+          <p:spPr>
+            <a:xfrm>
+              <a:off x="7745622" y="3056705"/>
+              <a:ext cx="210312" cy="369332"/>
+            </a:xfrm>
+            <a:prstGeom prst="rect">
+              <a:avLst/>
+            </a:prstGeom>
+            <a:noFill/>
+          </p:spPr>
+          <p:txBody>
+            <a:bodyPr wrap="square" rtlCol="0">
+              <a:spAutoFit/>
+            </a:bodyPr>
+            <a:lstStyle/>
+            <a:p>
+              <a:pPr algn="ctr"/>
+              <a:r>
+                <a:rPr lang="en-US" dirty="0" smtClean="0"/>
+                <a:t>p</a:t>
+              </a:r>
+              <a:endParaRPr lang="en-US" dirty="0"/>
+            </a:p>
+          </p:txBody>
+        </p:sp>
+        <p:sp>
+          <p:nvSpPr>
+            <p:cNvPr id="16" name="TextBox 15"/>
+            <p:cNvSpPr txBox="1"/>
+            <p:nvPr/>
+          </p:nvSpPr>
+          <p:spPr>
+            <a:xfrm>
+              <a:off x="4409133" y="3056705"/>
+              <a:ext cx="210312" cy="369332"/>
+            </a:xfrm>
+            <a:prstGeom prst="rect">
+              <a:avLst/>
+            </a:prstGeom>
+            <a:noFill/>
+          </p:spPr>
+          <p:txBody>
+            <a:bodyPr wrap="square" rtlCol="0">
+              <a:spAutoFit/>
+            </a:bodyPr>
+            <a:lstStyle/>
+            <a:p>
+              <a:pPr algn="ctr"/>
+              <a:r>
+                <a:rPr lang="en-US" dirty="0" smtClean="0"/>
+                <a:t>c</a:t>
+              </a:r>
+              <a:endParaRPr lang="en-US" dirty="0"/>
+            </a:p>
+          </p:txBody>
+        </p:sp>
+        <p:sp>
+          <p:nvSpPr>
+            <p:cNvPr id="21" name="TextBox 20"/>
+            <p:cNvSpPr txBox="1"/>
+            <p:nvPr/>
+          </p:nvSpPr>
+          <p:spPr>
+            <a:xfrm>
+              <a:off x="4665786" y="3056705"/>
+              <a:ext cx="210312" cy="369332"/>
+            </a:xfrm>
+            <a:prstGeom prst="rect">
+              <a:avLst/>
+            </a:prstGeom>
+            <a:noFill/>
+          </p:spPr>
+          <p:txBody>
+            <a:bodyPr wrap="square" rtlCol="0">
+              <a:spAutoFit/>
+            </a:bodyPr>
+            <a:lstStyle/>
+            <a:p>
+              <a:pPr algn="ctr"/>
+              <a:r>
+                <a:rPr lang="en-US" dirty="0" smtClean="0"/>
+                <a:t>d</a:t>
+              </a:r>
+              <a:endParaRPr lang="en-US" dirty="0"/>
+            </a:p>
+          </p:txBody>
+        </p:sp>
+        <p:sp>
+          <p:nvSpPr>
+            <p:cNvPr id="22" name="TextBox 21"/>
+            <p:cNvSpPr txBox="1"/>
+            <p:nvPr/>
+          </p:nvSpPr>
+          <p:spPr>
+            <a:xfrm>
+              <a:off x="5179092" y="3056705"/>
+              <a:ext cx="210312" cy="369332"/>
+            </a:xfrm>
+            <a:prstGeom prst="rect">
+              <a:avLst/>
+            </a:prstGeom>
+            <a:noFill/>
+          </p:spPr>
+          <p:txBody>
+            <a:bodyPr wrap="square" rtlCol="0">
+              <a:spAutoFit/>
+            </a:bodyPr>
+            <a:lstStyle/>
+            <a:p>
+              <a:pPr algn="ctr"/>
+              <a:r>
+                <a:rPr lang="en-US" dirty="0" smtClean="0"/>
+                <a:t>f</a:t>
+              </a:r>
+              <a:endParaRPr lang="en-US" dirty="0"/>
+            </a:p>
+          </p:txBody>
+        </p:sp>
+        <p:sp>
+          <p:nvSpPr>
+            <p:cNvPr id="23" name="TextBox 22"/>
+            <p:cNvSpPr txBox="1"/>
+            <p:nvPr/>
+          </p:nvSpPr>
+          <p:spPr>
+            <a:xfrm>
+              <a:off x="4922439" y="3056705"/>
+              <a:ext cx="210312" cy="369332"/>
+            </a:xfrm>
+            <a:prstGeom prst="rect">
+              <a:avLst/>
+            </a:prstGeom>
+            <a:noFill/>
+          </p:spPr>
+          <p:txBody>
+            <a:bodyPr wrap="square" rtlCol="0">
+              <a:spAutoFit/>
+            </a:bodyPr>
+            <a:lstStyle/>
+            <a:p>
+              <a:pPr algn="ctr"/>
+              <a:r>
+                <a:rPr lang="en-US" dirty="0" smtClean="0"/>
+                <a:t>e</a:t>
+              </a:r>
+              <a:endParaRPr lang="en-US" dirty="0"/>
+            </a:p>
+          </p:txBody>
+        </p:sp>
+        <p:sp>
+          <p:nvSpPr>
+            <p:cNvPr id="24" name="TextBox 23"/>
+            <p:cNvSpPr txBox="1"/>
+            <p:nvPr/>
+          </p:nvSpPr>
+          <p:spPr>
+            <a:xfrm>
+              <a:off x="5949051" y="3056705"/>
+              <a:ext cx="210312" cy="369332"/>
+            </a:xfrm>
+            <a:prstGeom prst="rect">
+              <a:avLst/>
+            </a:prstGeom>
+            <a:noFill/>
+          </p:spPr>
+          <p:txBody>
+            <a:bodyPr wrap="square" rtlCol="0">
+              <a:spAutoFit/>
+            </a:bodyPr>
+            <a:lstStyle/>
+            <a:p>
+              <a:pPr algn="ctr"/>
+              <a:r>
+                <a:rPr lang="en-US" dirty="0" smtClean="0"/>
+                <a:t>i</a:t>
+              </a:r>
+              <a:endParaRPr lang="en-US" dirty="0"/>
+            </a:p>
+          </p:txBody>
+        </p:sp>
+        <p:sp>
+          <p:nvSpPr>
+            <p:cNvPr id="25" name="TextBox 24"/>
+            <p:cNvSpPr txBox="1"/>
+            <p:nvPr/>
+          </p:nvSpPr>
+          <p:spPr>
+            <a:xfrm>
+              <a:off x="5435745" y="3056705"/>
+              <a:ext cx="210312" cy="369332"/>
+            </a:xfrm>
+            <a:prstGeom prst="rect">
+              <a:avLst/>
+            </a:prstGeom>
+            <a:noFill/>
+          </p:spPr>
+          <p:txBody>
+            <a:bodyPr wrap="square" rtlCol="0">
+              <a:spAutoFit/>
+            </a:bodyPr>
+            <a:lstStyle/>
+            <a:p>
+              <a:pPr algn="ctr"/>
+              <a:r>
+                <a:rPr lang="en-US" dirty="0" smtClean="0"/>
+                <a:t>g</a:t>
+              </a:r>
+              <a:endParaRPr lang="en-US" dirty="0"/>
+            </a:p>
+          </p:txBody>
+        </p:sp>
+        <p:sp>
+          <p:nvSpPr>
+            <p:cNvPr id="26" name="TextBox 25"/>
+            <p:cNvSpPr txBox="1"/>
+            <p:nvPr/>
+          </p:nvSpPr>
+          <p:spPr>
+            <a:xfrm>
+              <a:off x="5692398" y="3056705"/>
+              <a:ext cx="210312" cy="369332"/>
+            </a:xfrm>
+            <a:prstGeom prst="rect">
+              <a:avLst/>
+            </a:prstGeom>
+            <a:noFill/>
+          </p:spPr>
+          <p:txBody>
+            <a:bodyPr wrap="square" rtlCol="0">
+              <a:spAutoFit/>
+            </a:bodyPr>
+            <a:lstStyle/>
+            <a:p>
+              <a:pPr algn="ctr"/>
+              <a:r>
+                <a:rPr lang="en-US" dirty="0" smtClean="0"/>
+                <a:t>h</a:t>
+              </a:r>
+              <a:endParaRPr lang="en-US" dirty="0"/>
+            </a:p>
+          </p:txBody>
+        </p:sp>
+        <p:sp>
+          <p:nvSpPr>
+            <p:cNvPr id="27" name="TextBox 26"/>
+            <p:cNvSpPr txBox="1"/>
+            <p:nvPr/>
+          </p:nvSpPr>
+          <p:spPr>
+            <a:xfrm>
+              <a:off x="6205704" y="3056705"/>
+              <a:ext cx="210312" cy="369332"/>
+            </a:xfrm>
+            <a:prstGeom prst="rect">
+              <a:avLst/>
+            </a:prstGeom>
+            <a:noFill/>
+          </p:spPr>
+          <p:txBody>
+            <a:bodyPr wrap="square" rtlCol="0">
+              <a:spAutoFit/>
+            </a:bodyPr>
+            <a:lstStyle/>
+            <a:p>
+              <a:pPr algn="ctr"/>
+              <a:r>
+                <a:rPr lang="en-US" dirty="0" smtClean="0"/>
+                <a:t>j</a:t>
+              </a:r>
+              <a:endParaRPr lang="en-US" dirty="0"/>
+            </a:p>
+          </p:txBody>
+        </p:sp>
+        <p:sp>
+          <p:nvSpPr>
+            <p:cNvPr id="28" name="TextBox 27"/>
+            <p:cNvSpPr txBox="1"/>
+            <p:nvPr/>
+          </p:nvSpPr>
+          <p:spPr>
+            <a:xfrm>
+              <a:off x="6462357" y="3056705"/>
+              <a:ext cx="210312" cy="369332"/>
+            </a:xfrm>
+            <a:prstGeom prst="rect">
+              <a:avLst/>
+            </a:prstGeom>
+            <a:noFill/>
+          </p:spPr>
+          <p:txBody>
+            <a:bodyPr wrap="square" rtlCol="0">
+              <a:spAutoFit/>
+            </a:bodyPr>
+            <a:lstStyle/>
+            <a:p>
+              <a:pPr algn="ctr"/>
+              <a:r>
+                <a:rPr lang="en-US" dirty="0" smtClean="0"/>
+                <a:t>k</a:t>
+              </a:r>
+              <a:endParaRPr lang="en-US" dirty="0"/>
+            </a:p>
+          </p:txBody>
+        </p:sp>
+        <p:sp>
+          <p:nvSpPr>
+            <p:cNvPr id="29" name="TextBox 28"/>
+            <p:cNvSpPr txBox="1"/>
+            <p:nvPr/>
+          </p:nvSpPr>
+          <p:spPr>
+            <a:xfrm>
+              <a:off x="6719010" y="3056705"/>
+              <a:ext cx="210312" cy="369332"/>
+            </a:xfrm>
+            <a:prstGeom prst="rect">
+              <a:avLst/>
+            </a:prstGeom>
+            <a:noFill/>
+          </p:spPr>
+          <p:txBody>
+            <a:bodyPr wrap="square" rtlCol="0">
+              <a:spAutoFit/>
+            </a:bodyPr>
+            <a:lstStyle/>
+            <a:p>
+              <a:pPr algn="ctr"/>
+              <a:r>
+                <a:rPr lang="en-US" dirty="0" smtClean="0"/>
+                <a:t>l</a:t>
+              </a:r>
+              <a:endParaRPr lang="en-US" dirty="0"/>
+            </a:p>
+          </p:txBody>
+        </p:sp>
+        <p:sp>
+          <p:nvSpPr>
+            <p:cNvPr id="31" name="TextBox 30"/>
+            <p:cNvSpPr txBox="1"/>
+            <p:nvPr/>
+          </p:nvSpPr>
+          <p:spPr>
+            <a:xfrm>
+              <a:off x="6975663" y="3056705"/>
+              <a:ext cx="210312" cy="369332"/>
+            </a:xfrm>
+            <a:prstGeom prst="rect">
+              <a:avLst/>
+            </a:prstGeom>
+            <a:noFill/>
+          </p:spPr>
+          <p:txBody>
+            <a:bodyPr wrap="square" rtlCol="0">
+              <a:spAutoFit/>
+            </a:bodyPr>
+            <a:lstStyle/>
+            <a:p>
+              <a:pPr algn="ctr"/>
+              <a:r>
+                <a:rPr lang="en-US" dirty="0" smtClean="0"/>
+                <a:t>m</a:t>
+              </a:r>
+              <a:endParaRPr lang="en-US" dirty="0"/>
+            </a:p>
+          </p:txBody>
+        </p:sp>
+        <p:sp>
+          <p:nvSpPr>
+            <p:cNvPr id="32" name="TextBox 31"/>
+            <p:cNvSpPr txBox="1"/>
+            <p:nvPr/>
+          </p:nvSpPr>
+          <p:spPr>
+            <a:xfrm>
+              <a:off x="7232316" y="3056705"/>
+              <a:ext cx="210312" cy="369332"/>
+            </a:xfrm>
+            <a:prstGeom prst="rect">
+              <a:avLst/>
+            </a:prstGeom>
+            <a:noFill/>
+          </p:spPr>
+          <p:txBody>
+            <a:bodyPr wrap="square" rtlCol="0">
+              <a:spAutoFit/>
+            </a:bodyPr>
+            <a:lstStyle/>
+            <a:p>
+              <a:pPr algn="ctr"/>
+              <a:r>
+                <a:rPr lang="en-US" dirty="0" smtClean="0"/>
+                <a:t>n</a:t>
+              </a:r>
+              <a:endParaRPr lang="en-US" dirty="0"/>
+            </a:p>
+          </p:txBody>
+        </p:sp>
+        <p:sp>
+          <p:nvSpPr>
+            <p:cNvPr id="33" name="TextBox 32"/>
+            <p:cNvSpPr txBox="1"/>
+            <p:nvPr/>
+          </p:nvSpPr>
+          <p:spPr>
+            <a:xfrm>
+              <a:off x="7488969" y="3056705"/>
+              <a:ext cx="210312" cy="369332"/>
+            </a:xfrm>
+            <a:prstGeom prst="rect">
+              <a:avLst/>
+            </a:prstGeom>
+            <a:noFill/>
+          </p:spPr>
+          <p:txBody>
+            <a:bodyPr wrap="square" rtlCol="0">
+              <a:spAutoFit/>
+            </a:bodyPr>
+            <a:lstStyle/>
+            <a:p>
+              <a:pPr algn="ctr"/>
+              <a:r>
+                <a:rPr lang="en-US" dirty="0" smtClean="0"/>
+                <a:t>o</a:t>
+              </a:r>
+              <a:endParaRPr lang="en-US" dirty="0"/>
+            </a:p>
+          </p:txBody>
+        </p:sp>
+      </p:grpSp>
+      <p:grpSp>
+        <p:nvGrpSpPr>
+          <p:cNvPr id="35" name="Group 34"/>
+          <p:cNvGrpSpPr/>
+          <p:nvPr/>
+        </p:nvGrpSpPr>
+        <p:grpSpPr>
+          <a:xfrm>
+            <a:off x="3725966" y="3640988"/>
+            <a:ext cx="5027750" cy="1558967"/>
+            <a:chOff x="3725966" y="3640988"/>
+            <a:chExt cx="5027750" cy="1558967"/>
+          </a:xfrm>
+        </p:grpSpPr>
+        <p:sp>
+          <p:nvSpPr>
+            <p:cNvPr id="5" name="Rectangle 4"/>
+            <p:cNvSpPr/>
+            <p:nvPr/>
+          </p:nvSpPr>
+          <p:spPr>
+            <a:xfrm>
+              <a:off x="3725966" y="4512179"/>
+              <a:ext cx="598206" cy="649481"/>
+            </a:xfrm>
+            <a:prstGeom prst="rect">
+              <a:avLst/>
+            </a:prstGeom>
+            <a:solidFill>
+              <a:schemeClr val="accent1">
+                <a:alpha val="50000"/>
+              </a:schemeClr>
+            </a:solidFill>
+            <a:effectLst/>
+          </p:spPr>
+          <p:style>
+            <a:lnRef idx="2">
+              <a:schemeClr val="accent1">
+                <a:shade val="50000"/>
+              </a:schemeClr>
+            </a:lnRef>
+            <a:fillRef idx="1">
+              <a:schemeClr val="accent1"/>
+            </a:fillRef>
+            <a:effectRef idx="0">
+              <a:schemeClr val="accent1"/>
+            </a:effectRef>
+            <a:fontRef idx="minor">
+              <a:schemeClr val="lt1"/>
+            </a:fontRef>
+          </p:style>
+          <p:txBody>
+            <a:bodyPr rtlCol="0" anchor="ctr"/>
+            <a:lstStyle/>
+            <a:p>
+              <a:pPr algn="ctr"/>
+              <a:endParaRPr lang="en-US"/>
+            </a:p>
+          </p:txBody>
+        </p:sp>
+        <p:sp>
+          <p:nvSpPr>
+            <p:cNvPr id="6" name="Rectangle 5"/>
+            <p:cNvSpPr/>
+            <p:nvPr/>
+          </p:nvSpPr>
+          <p:spPr>
+            <a:xfrm>
+              <a:off x="4862557" y="3640988"/>
+              <a:ext cx="863125" cy="797288"/>
+            </a:xfrm>
+            <a:prstGeom prst="rect">
+              <a:avLst/>
+            </a:prstGeom>
+            <a:solidFill>
+              <a:schemeClr val="accent1">
+                <a:alpha val="50000"/>
+              </a:schemeClr>
+            </a:solidFill>
+            <a:effectLst/>
+          </p:spPr>
+          <p:style>
+            <a:lnRef idx="2">
+              <a:schemeClr val="accent1">
+                <a:shade val="50000"/>
+              </a:schemeClr>
+            </a:lnRef>
+            <a:fillRef idx="1">
+              <a:schemeClr val="accent1"/>
+            </a:fillRef>
+            <a:effectRef idx="0">
+              <a:schemeClr val="accent1"/>
+            </a:effectRef>
+            <a:fontRef idx="minor">
+              <a:schemeClr val="lt1"/>
+            </a:fontRef>
+          </p:style>
+          <p:txBody>
+            <a:bodyPr rtlCol="0" anchor="ctr"/>
+            <a:lstStyle/>
+            <a:p>
+              <a:pPr algn="ctr"/>
+              <a:endParaRPr lang="en-US"/>
+            </a:p>
+          </p:txBody>
+        </p:sp>
+        <p:sp>
+          <p:nvSpPr>
+            <p:cNvPr id="7" name="Rectangle 6"/>
+            <p:cNvSpPr/>
+            <p:nvPr/>
+          </p:nvSpPr>
+          <p:spPr>
+            <a:xfrm>
+              <a:off x="6774679" y="3645100"/>
+              <a:ext cx="873807" cy="867079"/>
+            </a:xfrm>
+            <a:prstGeom prst="rect">
+              <a:avLst/>
+            </a:prstGeom>
+            <a:solidFill>
+              <a:schemeClr val="accent1">
+                <a:alpha val="50000"/>
+              </a:schemeClr>
+            </a:solidFill>
+            <a:effectLst/>
+          </p:spPr>
+          <p:style>
+            <a:lnRef idx="2">
+              <a:schemeClr val="accent1">
+                <a:shade val="50000"/>
+              </a:schemeClr>
+            </a:lnRef>
+            <a:fillRef idx="1">
+              <a:schemeClr val="accent1"/>
+            </a:fillRef>
+            <a:effectRef idx="0">
+              <a:schemeClr val="accent1"/>
+            </a:effectRef>
+            <a:fontRef idx="minor">
+              <a:schemeClr val="lt1"/>
+            </a:fontRef>
+          </p:style>
+          <p:txBody>
+            <a:bodyPr rtlCol="0" anchor="ctr"/>
+            <a:lstStyle/>
+            <a:p>
+              <a:pPr algn="ctr"/>
+              <a:endParaRPr lang="en-US"/>
+            </a:p>
+          </p:txBody>
+        </p:sp>
+        <p:sp>
+          <p:nvSpPr>
+            <p:cNvPr id="34" name="Rectangle 33"/>
+            <p:cNvSpPr/>
+            <p:nvPr/>
+          </p:nvSpPr>
+          <p:spPr>
+            <a:xfrm>
+              <a:off x="8155510" y="4550474"/>
+              <a:ext cx="598206" cy="649481"/>
+            </a:xfrm>
+            <a:prstGeom prst="rect">
+              <a:avLst/>
+            </a:prstGeom>
+            <a:solidFill>
+              <a:schemeClr val="accent1">
+                <a:alpha val="50000"/>
+              </a:schemeClr>
+            </a:solidFill>
+            <a:effectLst/>
+          </p:spPr>
+          <p:style>
+            <a:lnRef idx="2">
+              <a:schemeClr val="accent1">
+                <a:shade val="50000"/>
+              </a:schemeClr>
+            </a:lnRef>
+            <a:fillRef idx="1">
+              <a:schemeClr val="accent1"/>
+            </a:fillRef>
+            <a:effectRef idx="0">
+              <a:schemeClr val="accent1"/>
+            </a:effectRef>
+            <a:fontRef idx="minor">
+              <a:schemeClr val="lt1"/>
+            </a:fontRef>
+          </p:style>
+          <p:txBody>
+            <a:bodyPr rtlCol="0" anchor="ctr"/>
+            <a:lstStyle/>
+            <a:p>
+              <a:pPr algn="ctr"/>
+              <a:endParaRPr lang="en-US"/>
+            </a:p>
+          </p:txBody>
+        </p:sp>
+      </p:grpSp>
+      <p:grpSp>
+        <p:nvGrpSpPr>
+          <p:cNvPr id="46" name="Group 45"/>
+          <p:cNvGrpSpPr/>
+          <p:nvPr/>
+        </p:nvGrpSpPr>
+        <p:grpSpPr>
+          <a:xfrm>
+            <a:off x="4837846" y="3266893"/>
+            <a:ext cx="179780" cy="1935571"/>
+            <a:chOff x="4837846" y="3266893"/>
+            <a:chExt cx="179780" cy="1935571"/>
+          </a:xfrm>
+        </p:grpSpPr>
+        <p:sp>
+          <p:nvSpPr>
+            <p:cNvPr id="39" name="TextBox 38"/>
+            <p:cNvSpPr txBox="1"/>
+            <p:nvPr/>
+          </p:nvSpPr>
+          <p:spPr>
+            <a:xfrm>
+              <a:off x="4837846" y="3266893"/>
+              <a:ext cx="179780" cy="369332"/>
+            </a:xfrm>
+            <a:prstGeom prst="rect">
+              <a:avLst/>
+            </a:prstGeom>
+            <a:noFill/>
+          </p:spPr>
+          <p:txBody>
+            <a:bodyPr wrap="square" rtlCol="0">
+              <a:spAutoFit/>
+            </a:bodyPr>
+            <a:lstStyle/>
+            <a:p>
+              <a:pPr algn="ctr"/>
+              <a:r>
+                <a:rPr lang="en-US" dirty="0" smtClean="0"/>
+                <a:t>0</a:t>
+              </a:r>
+              <a:endParaRPr lang="en-US" dirty="0"/>
+            </a:p>
+          </p:txBody>
+        </p:sp>
+        <p:sp>
+          <p:nvSpPr>
+            <p:cNvPr id="40" name="TextBox 39"/>
+            <p:cNvSpPr txBox="1"/>
+            <p:nvPr/>
+          </p:nvSpPr>
+          <p:spPr>
+            <a:xfrm>
+              <a:off x="4837846" y="3527933"/>
+              <a:ext cx="179780" cy="369332"/>
+            </a:xfrm>
+            <a:prstGeom prst="rect">
+              <a:avLst/>
+            </a:prstGeom>
+            <a:noFill/>
+          </p:spPr>
+          <p:txBody>
+            <a:bodyPr wrap="square" rtlCol="0">
+              <a:spAutoFit/>
+            </a:bodyPr>
+            <a:lstStyle/>
+            <a:p>
+              <a:pPr algn="ctr"/>
+              <a:r>
+                <a:rPr lang="en-US" dirty="0" smtClean="0"/>
+                <a:t>1</a:t>
+              </a:r>
+              <a:endParaRPr lang="en-US" dirty="0"/>
+            </a:p>
+          </p:txBody>
+        </p:sp>
+        <p:sp>
+          <p:nvSpPr>
+            <p:cNvPr id="41" name="TextBox 40"/>
+            <p:cNvSpPr txBox="1"/>
+            <p:nvPr/>
+          </p:nvSpPr>
+          <p:spPr>
+            <a:xfrm>
+              <a:off x="4837846" y="3788973"/>
+              <a:ext cx="179780" cy="369332"/>
+            </a:xfrm>
+            <a:prstGeom prst="rect">
+              <a:avLst/>
+            </a:prstGeom>
+            <a:noFill/>
+          </p:spPr>
+          <p:txBody>
+            <a:bodyPr wrap="square" rtlCol="0">
+              <a:spAutoFit/>
+            </a:bodyPr>
+            <a:lstStyle/>
+            <a:p>
+              <a:pPr algn="ctr"/>
+              <a:r>
+                <a:rPr lang="en-US" dirty="0" smtClean="0"/>
+                <a:t>2</a:t>
+              </a:r>
+              <a:endParaRPr lang="en-US" dirty="0"/>
+            </a:p>
+          </p:txBody>
+        </p:sp>
+        <p:sp>
+          <p:nvSpPr>
+            <p:cNvPr id="42" name="TextBox 41"/>
+            <p:cNvSpPr txBox="1"/>
+            <p:nvPr/>
+          </p:nvSpPr>
+          <p:spPr>
+            <a:xfrm>
+              <a:off x="4837846" y="4050013"/>
+              <a:ext cx="179780" cy="369332"/>
+            </a:xfrm>
+            <a:prstGeom prst="rect">
+              <a:avLst/>
+            </a:prstGeom>
+            <a:noFill/>
+          </p:spPr>
+          <p:txBody>
+            <a:bodyPr wrap="square" rtlCol="0">
+              <a:spAutoFit/>
+            </a:bodyPr>
+            <a:lstStyle/>
+            <a:p>
+              <a:pPr algn="ctr"/>
+              <a:r>
+                <a:rPr lang="en-US" dirty="0" smtClean="0"/>
+                <a:t>3</a:t>
+              </a:r>
+              <a:endParaRPr lang="en-US" dirty="0"/>
+            </a:p>
+          </p:txBody>
+        </p:sp>
+        <p:sp>
+          <p:nvSpPr>
+            <p:cNvPr id="43" name="TextBox 42"/>
+            <p:cNvSpPr txBox="1"/>
+            <p:nvPr/>
+          </p:nvSpPr>
+          <p:spPr>
+            <a:xfrm>
+              <a:off x="4837846" y="4311053"/>
+              <a:ext cx="179780" cy="369332"/>
+            </a:xfrm>
+            <a:prstGeom prst="rect">
+              <a:avLst/>
+            </a:prstGeom>
+            <a:noFill/>
+          </p:spPr>
+          <p:txBody>
+            <a:bodyPr wrap="square" rtlCol="0">
+              <a:spAutoFit/>
+            </a:bodyPr>
+            <a:lstStyle/>
+            <a:p>
+              <a:pPr algn="ctr"/>
+              <a:r>
+                <a:rPr lang="en-US" dirty="0" smtClean="0"/>
+                <a:t>4</a:t>
+              </a:r>
+              <a:endParaRPr lang="en-US" dirty="0"/>
+            </a:p>
+          </p:txBody>
+        </p:sp>
+        <p:sp>
+          <p:nvSpPr>
+            <p:cNvPr id="44" name="TextBox 43"/>
+            <p:cNvSpPr txBox="1"/>
+            <p:nvPr/>
+          </p:nvSpPr>
+          <p:spPr>
+            <a:xfrm>
+              <a:off x="4837846" y="4572093"/>
+              <a:ext cx="179780" cy="369332"/>
+            </a:xfrm>
+            <a:prstGeom prst="rect">
+              <a:avLst/>
+            </a:prstGeom>
+            <a:noFill/>
+          </p:spPr>
+          <p:txBody>
+            <a:bodyPr wrap="square" rtlCol="0">
+              <a:spAutoFit/>
+            </a:bodyPr>
+            <a:lstStyle/>
+            <a:p>
+              <a:pPr algn="ctr"/>
+              <a:r>
+                <a:rPr lang="en-US" dirty="0" smtClean="0"/>
+                <a:t>5</a:t>
+              </a:r>
+              <a:endParaRPr lang="en-US" dirty="0"/>
+            </a:p>
+          </p:txBody>
+        </p:sp>
+        <p:sp>
+          <p:nvSpPr>
+            <p:cNvPr id="45" name="TextBox 44"/>
+            <p:cNvSpPr txBox="1"/>
+            <p:nvPr/>
+          </p:nvSpPr>
+          <p:spPr>
+            <a:xfrm>
+              <a:off x="4837846" y="4833132"/>
+              <a:ext cx="179780" cy="369332"/>
+            </a:xfrm>
+            <a:prstGeom prst="rect">
+              <a:avLst/>
+            </a:prstGeom>
+            <a:noFill/>
+          </p:spPr>
+          <p:txBody>
+            <a:bodyPr wrap="square" rtlCol="0">
+              <a:spAutoFit/>
+            </a:bodyPr>
+            <a:lstStyle/>
+            <a:p>
+              <a:pPr algn="ctr"/>
+              <a:r>
+                <a:rPr lang="en-US" dirty="0" smtClean="0"/>
+                <a:t>6</a:t>
+              </a:r>
+              <a:endParaRPr lang="en-US" dirty="0"/>
+            </a:p>
+          </p:txBody>
+        </p:sp>
+      </p:grpSp>
+    </p:spTree>
+    <p:extLst>
+      <p:ext uri="{BB962C8B-B14F-4D97-AF65-F5344CB8AC3E}">
+        <p14:creationId xmlns:p14="http://schemas.microsoft.com/office/powerpoint/2010/main" val="1160556434"/>
+      </p:ext>
+    </p:extLst>
+  </p:cSld>
+  <p:clrMapOvr>
+    <a:masterClrMapping/>
+  </p:clrMapOvr>
+</p:sld>
+</file>
+
 <file path=ppt/theme/theme1.xml><?xml version="1.0" encoding="utf-8"?>
 <a:theme xmlns:a="http://schemas.openxmlformats.org/drawingml/2006/main" name="Office Theme">
   <a:themeElements>

</xml_diff>

<commit_message>
committing extra changes which may have not been saved before committing last time
</commit_message>
<xml_diff>
--- a/docs/wiring.pptx
+++ b/docs/wiring.pptx
@@ -6947,7 +6947,7 @@
             <p:ph idx="1"/>
           </p:nvPr>
         </p:nvPicPr>
-        <p:blipFill>
+        <p:blipFill rotWithShape="1">
           <a:blip r:embed="rId2" cstate="print">
             <a:extLst>
               <a:ext uri="{28A0092B-C50C-407E-A947-70E740481C1C}">
@@ -6955,14 +6955,13 @@
               </a:ext>
             </a:extLst>
           </a:blip>
-          <a:stretch>
-            <a:fillRect/>
-          </a:stretch>
+          <a:srcRect l="16538" t="38143" r="22050" b="19410"/>
+          <a:stretch/>
         </p:blipFill>
         <p:spPr>
           <a:xfrm>
-            <a:off x="1880075" y="1249885"/>
-            <a:ext cx="9135453" cy="5138691"/>
+            <a:off x="3390900" y="3209925"/>
+            <a:ext cx="5610226" cy="2181225"/>
           </a:xfrm>
         </p:spPr>
       </p:pic>

</xml_diff>

<commit_message>
Updated pins for new board
</commit_message>
<xml_diff>
--- a/docs/wiring.pptx
+++ b/docs/wiring.pptx
@@ -12,6 +12,7 @@
     <p:sldId id="260" r:id="rId6"/>
     <p:sldId id="262" r:id="rId7"/>
     <p:sldId id="259" r:id="rId8"/>
+    <p:sldId id="264" r:id="rId9"/>
   </p:sldIdLst>
   <p:sldSz cx="12192000" cy="6858000"/>
   <p:notesSz cx="6858000" cy="9144000"/>
@@ -126,6 +127,7 @@
         <p14:section name="shapes version" id="{95BD8D15-447B-4C76-99EE-FA60D2C0A7FE}">
           <p14:sldIdLst>
             <p14:sldId id="259"/>
+            <p14:sldId id="264"/>
           </p14:sldIdLst>
         </p14:section>
       </p14:sectionLst>
@@ -268,7 +270,7 @@
           <a:p>
             <a:fld id="{F91AB40E-11DA-42CE-93B8-E3535B8A82AA}" type="datetimeFigureOut">
               <a:rPr lang="en-US" smtClean="0"/>
-              <a:t>4/2/2017</a:t>
+              <a:t>4/4/2017</a:t>
             </a:fld>
             <a:endParaRPr lang="en-US"/>
           </a:p>
@@ -438,7 +440,7 @@
           <a:p>
             <a:fld id="{F91AB40E-11DA-42CE-93B8-E3535B8A82AA}" type="datetimeFigureOut">
               <a:rPr lang="en-US" smtClean="0"/>
-              <a:t>4/2/2017</a:t>
+              <a:t>4/4/2017</a:t>
             </a:fld>
             <a:endParaRPr lang="en-US"/>
           </a:p>
@@ -618,7 +620,7 @@
           <a:p>
             <a:fld id="{F91AB40E-11DA-42CE-93B8-E3535B8A82AA}" type="datetimeFigureOut">
               <a:rPr lang="en-US" smtClean="0"/>
-              <a:t>4/2/2017</a:t>
+              <a:t>4/4/2017</a:t>
             </a:fld>
             <a:endParaRPr lang="en-US"/>
           </a:p>
@@ -788,7 +790,7 @@
           <a:p>
             <a:fld id="{F91AB40E-11DA-42CE-93B8-E3535B8A82AA}" type="datetimeFigureOut">
               <a:rPr lang="en-US" smtClean="0"/>
-              <a:t>4/2/2017</a:t>
+              <a:t>4/4/2017</a:t>
             </a:fld>
             <a:endParaRPr lang="en-US"/>
           </a:p>
@@ -1034,7 +1036,7 @@
           <a:p>
             <a:fld id="{F91AB40E-11DA-42CE-93B8-E3535B8A82AA}" type="datetimeFigureOut">
               <a:rPr lang="en-US" smtClean="0"/>
-              <a:t>4/2/2017</a:t>
+              <a:t>4/4/2017</a:t>
             </a:fld>
             <a:endParaRPr lang="en-US"/>
           </a:p>
@@ -1266,7 +1268,7 @@
           <a:p>
             <a:fld id="{F91AB40E-11DA-42CE-93B8-E3535B8A82AA}" type="datetimeFigureOut">
               <a:rPr lang="en-US" smtClean="0"/>
-              <a:t>4/2/2017</a:t>
+              <a:t>4/4/2017</a:t>
             </a:fld>
             <a:endParaRPr lang="en-US"/>
           </a:p>
@@ -1633,7 +1635,7 @@
           <a:p>
             <a:fld id="{F91AB40E-11DA-42CE-93B8-E3535B8A82AA}" type="datetimeFigureOut">
               <a:rPr lang="en-US" smtClean="0"/>
-              <a:t>4/2/2017</a:t>
+              <a:t>4/4/2017</a:t>
             </a:fld>
             <a:endParaRPr lang="en-US"/>
           </a:p>
@@ -1751,7 +1753,7 @@
           <a:p>
             <a:fld id="{F91AB40E-11DA-42CE-93B8-E3535B8A82AA}" type="datetimeFigureOut">
               <a:rPr lang="en-US" smtClean="0"/>
-              <a:t>4/2/2017</a:t>
+              <a:t>4/4/2017</a:t>
             </a:fld>
             <a:endParaRPr lang="en-US"/>
           </a:p>
@@ -1846,7 +1848,7 @@
           <a:p>
             <a:fld id="{F91AB40E-11DA-42CE-93B8-E3535B8A82AA}" type="datetimeFigureOut">
               <a:rPr lang="en-US" smtClean="0"/>
-              <a:t>4/2/2017</a:t>
+              <a:t>4/4/2017</a:t>
             </a:fld>
             <a:endParaRPr lang="en-US"/>
           </a:p>
@@ -2123,7 +2125,7 @@
           <a:p>
             <a:fld id="{F91AB40E-11DA-42CE-93B8-E3535B8A82AA}" type="datetimeFigureOut">
               <a:rPr lang="en-US" smtClean="0"/>
-              <a:t>4/2/2017</a:t>
+              <a:t>4/4/2017</a:t>
             </a:fld>
             <a:endParaRPr lang="en-US"/>
           </a:p>
@@ -2376,7 +2378,7 @@
           <a:p>
             <a:fld id="{F91AB40E-11DA-42CE-93B8-E3535B8A82AA}" type="datetimeFigureOut">
               <a:rPr lang="en-US" smtClean="0"/>
-              <a:t>4/2/2017</a:t>
+              <a:t>4/4/2017</a:t>
             </a:fld>
             <a:endParaRPr lang="en-US"/>
           </a:p>
@@ -2589,7 +2591,7 @@
           <a:p>
             <a:fld id="{F91AB40E-11DA-42CE-93B8-E3535B8A82AA}" type="datetimeFigureOut">
               <a:rPr lang="en-US" smtClean="0"/>
-              <a:t>4/2/2017</a:t>
+              <a:t>4/4/2017</a:t>
             </a:fld>
             <a:endParaRPr lang="en-US"/>
           </a:p>
@@ -5709,6 +5711,93 @@
               <a:t>Stress sensing resistor</a:t>
             </a:r>
             <a:endParaRPr lang="en-US" dirty="0"/>
+          </a:p>
+        </p:txBody>
+      </p:sp>
+      <p:sp>
+        <p:nvSpPr>
+          <p:cNvPr id="2" name="TextBox 1"/>
+          <p:cNvSpPr txBox="1"/>
+          <p:nvPr/>
+        </p:nvSpPr>
+        <p:spPr>
+          <a:xfrm>
+            <a:off x="9315450" y="5429250"/>
+            <a:ext cx="1548822" cy="369332"/>
+          </a:xfrm>
+          <a:prstGeom prst="rect">
+            <a:avLst/>
+          </a:prstGeom>
+          <a:noFill/>
+        </p:spPr>
+        <p:txBody>
+          <a:bodyPr wrap="none" rtlCol="0">
+            <a:spAutoFit/>
+          </a:bodyPr>
+          <a:lstStyle/>
+          <a:p>
+            <a:r>
+              <a:rPr lang="en-US" dirty="0" smtClean="0"/>
+              <a:t>Servo GND Pin</a:t>
+            </a:r>
+          </a:p>
+        </p:txBody>
+      </p:sp>
+      <p:sp>
+        <p:nvSpPr>
+          <p:cNvPr id="7" name="TextBox 6"/>
+          <p:cNvSpPr txBox="1"/>
+          <p:nvPr/>
+        </p:nvSpPr>
+        <p:spPr>
+          <a:xfrm>
+            <a:off x="8995353" y="2069782"/>
+            <a:ext cx="1341649" cy="369332"/>
+          </a:xfrm>
+          <a:prstGeom prst="rect">
+            <a:avLst/>
+          </a:prstGeom>
+          <a:noFill/>
+        </p:spPr>
+        <p:txBody>
+          <a:bodyPr wrap="none" rtlCol="0">
+            <a:spAutoFit/>
+          </a:bodyPr>
+          <a:lstStyle/>
+          <a:p>
+            <a:r>
+              <a:rPr lang="en-US" dirty="0" smtClean="0"/>
+              <a:t>System GND</a:t>
+            </a:r>
+          </a:p>
+        </p:txBody>
+      </p:sp>
+      <p:sp>
+        <p:nvSpPr>
+          <p:cNvPr id="8" name="TextBox 7"/>
+          <p:cNvSpPr txBox="1"/>
+          <p:nvPr/>
+        </p:nvSpPr>
+        <p:spPr>
+          <a:xfrm>
+            <a:off x="8328576" y="3618586"/>
+            <a:ext cx="1064907" cy="369332"/>
+          </a:xfrm>
+          <a:prstGeom prst="rect">
+            <a:avLst/>
+          </a:prstGeom>
+          <a:noFill/>
+        </p:spPr>
+        <p:txBody>
+          <a:bodyPr wrap="none" rtlCol="0">
+            <a:spAutoFit/>
+          </a:bodyPr>
+          <a:lstStyle/>
+          <a:p>
+            <a:r>
+              <a:rPr lang="en-US" dirty="0" smtClean="0"/>
+              <a:t>1ohm res</a:t>
+            </a:r>
           </a:p>
         </p:txBody>
       </p:sp>
@@ -8012,6 +8101,1790 @@
 </p:sld>
 </file>
 
+<file path=ppt/slides/slide8.xml><?xml version="1.0" encoding="utf-8"?>
+<p:sld xmlns:a="http://schemas.openxmlformats.org/drawingml/2006/main" xmlns:r="http://schemas.openxmlformats.org/officeDocument/2006/relationships" xmlns:p="http://schemas.openxmlformats.org/presentationml/2006/main">
+  <p:cSld>
+    <p:spTree>
+      <p:nvGrpSpPr>
+        <p:cNvPr id="1" name=""/>
+        <p:cNvGrpSpPr/>
+        <p:nvPr/>
+      </p:nvGrpSpPr>
+      <p:grpSpPr>
+        <a:xfrm>
+          <a:off x="0" y="0"/>
+          <a:ext cx="0" cy="0"/>
+          <a:chOff x="0" y="0"/>
+          <a:chExt cx="0" cy="0"/>
+        </a:xfrm>
+      </p:grpSpPr>
+      <p:pic>
+        <p:nvPicPr>
+          <p:cNvPr id="6" name="Content Placeholder 5"/>
+          <p:cNvPicPr>
+            <a:picLocks noGrp="1" noChangeAspect="1"/>
+          </p:cNvPicPr>
+          <p:nvPr>
+            <p:ph idx="1"/>
+          </p:nvPr>
+        </p:nvPicPr>
+        <p:blipFill rotWithShape="1">
+          <a:blip r:embed="rId2">
+            <a:extLst>
+              <a:ext uri="{28A0092B-C50C-407E-A947-70E740481C1C}">
+                <a14:useLocalDpi xmlns:a14="http://schemas.microsoft.com/office/drawing/2010/main" val="0"/>
+              </a:ext>
+            </a:extLst>
+          </a:blip>
+          <a:srcRect l="16875" t="35980" r="23360" b="19910"/>
+          <a:stretch/>
+        </p:blipFill>
+        <p:spPr>
+          <a:xfrm>
+            <a:off x="1915885" y="3416682"/>
+            <a:ext cx="8551112" cy="3549191"/>
+          </a:xfrm>
+        </p:spPr>
+      </p:pic>
+      <p:pic>
+        <p:nvPicPr>
+          <p:cNvPr id="7" name="Picture 6"/>
+          <p:cNvPicPr>
+            <a:picLocks noChangeAspect="1"/>
+          </p:cNvPicPr>
+          <p:nvPr/>
+        </p:nvPicPr>
+        <p:blipFill rotWithShape="1">
+          <a:blip r:embed="rId3"/>
+          <a:srcRect r="5559"/>
+          <a:stretch/>
+        </p:blipFill>
+        <p:spPr>
+          <a:xfrm rot="5400000">
+            <a:off x="3662961" y="-807065"/>
+            <a:ext cx="3162302" cy="5457008"/>
+          </a:xfrm>
+          <a:prstGeom prst="rect">
+            <a:avLst/>
+          </a:prstGeom>
+        </p:spPr>
+      </p:pic>
+      <p:sp>
+        <p:nvSpPr>
+          <p:cNvPr id="8" name="TextBox 7"/>
+          <p:cNvSpPr txBox="1"/>
+          <p:nvPr/>
+        </p:nvSpPr>
+        <p:spPr>
+          <a:xfrm>
+            <a:off x="1915885" y="3416682"/>
+            <a:ext cx="796835" cy="338554"/>
+          </a:xfrm>
+          <a:prstGeom prst="rect">
+            <a:avLst/>
+          </a:prstGeom>
+          <a:solidFill>
+            <a:schemeClr val="tx1"/>
+          </a:solidFill>
+        </p:spPr>
+        <p:txBody>
+          <a:bodyPr wrap="square" rtlCol="0">
+            <a:spAutoFit/>
+          </a:bodyPr>
+          <a:lstStyle/>
+          <a:p>
+            <a:r>
+              <a:rPr lang="en-US" sz="1600" dirty="0" smtClean="0">
+                <a:solidFill>
+                  <a:srgbClr val="FF0000"/>
+                </a:solidFill>
+              </a:rPr>
+              <a:t>FRONT</a:t>
+            </a:r>
+            <a:endParaRPr lang="en-US" sz="1600" dirty="0">
+              <a:solidFill>
+                <a:srgbClr val="FF0000"/>
+              </a:solidFill>
+            </a:endParaRPr>
+          </a:p>
+        </p:txBody>
+      </p:sp>
+      <p:sp>
+        <p:nvSpPr>
+          <p:cNvPr id="10" name="TextBox 9"/>
+          <p:cNvSpPr txBox="1"/>
+          <p:nvPr/>
+        </p:nvSpPr>
+        <p:spPr>
+          <a:xfrm>
+            <a:off x="1915885" y="6627319"/>
+            <a:ext cx="796835" cy="338554"/>
+          </a:xfrm>
+          <a:prstGeom prst="rect">
+            <a:avLst/>
+          </a:prstGeom>
+          <a:solidFill>
+            <a:schemeClr val="tx1"/>
+          </a:solidFill>
+        </p:spPr>
+        <p:txBody>
+          <a:bodyPr wrap="square" rtlCol="0">
+            <a:spAutoFit/>
+          </a:bodyPr>
+          <a:lstStyle/>
+          <a:p>
+            <a:r>
+              <a:rPr lang="en-US" sz="1600" dirty="0" smtClean="0">
+                <a:solidFill>
+                  <a:srgbClr val="FF0000"/>
+                </a:solidFill>
+              </a:rPr>
+              <a:t>BACK</a:t>
+            </a:r>
+            <a:endParaRPr lang="en-US" sz="1600" dirty="0">
+              <a:solidFill>
+                <a:srgbClr val="FF0000"/>
+              </a:solidFill>
+            </a:endParaRPr>
+          </a:p>
+        </p:txBody>
+      </p:sp>
+      <p:sp>
+        <p:nvSpPr>
+          <p:cNvPr id="11" name="TextBox 10"/>
+          <p:cNvSpPr txBox="1"/>
+          <p:nvPr/>
+        </p:nvSpPr>
+        <p:spPr>
+          <a:xfrm>
+            <a:off x="133350" y="1235367"/>
+            <a:ext cx="2821934" cy="1200329"/>
+          </a:xfrm>
+          <a:prstGeom prst="rect">
+            <a:avLst/>
+          </a:prstGeom>
+          <a:noFill/>
+        </p:spPr>
+        <p:txBody>
+          <a:bodyPr wrap="square" rtlCol="0">
+            <a:spAutoFit/>
+          </a:bodyPr>
+          <a:lstStyle/>
+          <a:p>
+            <a:r>
+              <a:rPr lang="en-US" b="1" i="1" dirty="0" smtClean="0"/>
+              <a:t>Analog</a:t>
+            </a:r>
+          </a:p>
+          <a:p>
+            <a:r>
+              <a:rPr lang="en-US" dirty="0" smtClean="0"/>
+              <a:t>Microphone</a:t>
+            </a:r>
+          </a:p>
+          <a:p>
+            <a:r>
+              <a:rPr lang="en-US" dirty="0" smtClean="0"/>
+              <a:t>Stress sensing</a:t>
+            </a:r>
+          </a:p>
+          <a:p>
+            <a:r>
+              <a:rPr lang="en-US" dirty="0" smtClean="0"/>
+              <a:t>Random seed pin (empty)</a:t>
+            </a:r>
+          </a:p>
+        </p:txBody>
+      </p:sp>
+      <p:sp>
+        <p:nvSpPr>
+          <p:cNvPr id="12" name="TextBox 11"/>
+          <p:cNvSpPr txBox="1"/>
+          <p:nvPr/>
+        </p:nvSpPr>
+        <p:spPr>
+          <a:xfrm>
+            <a:off x="3371671" y="4597129"/>
+            <a:ext cx="796835" cy="584775"/>
+          </a:xfrm>
+          <a:prstGeom prst="rect">
+            <a:avLst/>
+          </a:prstGeom>
+          <a:solidFill>
+            <a:schemeClr val="tx1"/>
+          </a:solidFill>
+        </p:spPr>
+        <p:txBody>
+          <a:bodyPr wrap="square" rtlCol="0">
+            <a:spAutoFit/>
+          </a:bodyPr>
+          <a:lstStyle/>
+          <a:p>
+            <a:pPr algn="ctr"/>
+            <a:r>
+              <a:rPr lang="en-US" sz="1600" dirty="0" smtClean="0">
+                <a:solidFill>
+                  <a:srgbClr val="FF0000"/>
+                </a:solidFill>
+              </a:rPr>
+              <a:t>SERVO 1</a:t>
+            </a:r>
+            <a:endParaRPr lang="en-US" sz="1600" dirty="0">
+              <a:solidFill>
+                <a:srgbClr val="FF0000"/>
+              </a:solidFill>
+            </a:endParaRPr>
+          </a:p>
+        </p:txBody>
+      </p:sp>
+      <p:sp>
+        <p:nvSpPr>
+          <p:cNvPr id="13" name="TextBox 12"/>
+          <p:cNvSpPr txBox="1"/>
+          <p:nvPr/>
+        </p:nvSpPr>
+        <p:spPr>
+          <a:xfrm>
+            <a:off x="8430262" y="4597128"/>
+            <a:ext cx="796835" cy="584775"/>
+          </a:xfrm>
+          <a:prstGeom prst="rect">
+            <a:avLst/>
+          </a:prstGeom>
+          <a:solidFill>
+            <a:schemeClr val="tx1"/>
+          </a:solidFill>
+        </p:spPr>
+        <p:txBody>
+          <a:bodyPr wrap="square" rtlCol="0">
+            <a:spAutoFit/>
+          </a:bodyPr>
+          <a:lstStyle/>
+          <a:p>
+            <a:pPr algn="ctr"/>
+            <a:r>
+              <a:rPr lang="en-US" sz="1600" dirty="0" smtClean="0">
+                <a:solidFill>
+                  <a:srgbClr val="FF0000"/>
+                </a:solidFill>
+              </a:rPr>
+              <a:t>SERVO 2</a:t>
+            </a:r>
+            <a:endParaRPr lang="en-US" sz="1600" dirty="0">
+              <a:solidFill>
+                <a:srgbClr val="FF0000"/>
+              </a:solidFill>
+            </a:endParaRPr>
+          </a:p>
+        </p:txBody>
+      </p:sp>
+      <p:sp>
+        <p:nvSpPr>
+          <p:cNvPr id="14" name="TextBox 13"/>
+          <p:cNvSpPr txBox="1"/>
+          <p:nvPr/>
+        </p:nvSpPr>
+        <p:spPr>
+          <a:xfrm>
+            <a:off x="133350" y="3733983"/>
+            <a:ext cx="2484120" cy="3139321"/>
+          </a:xfrm>
+          <a:prstGeom prst="rect">
+            <a:avLst/>
+          </a:prstGeom>
+          <a:noFill/>
+        </p:spPr>
+        <p:txBody>
+          <a:bodyPr wrap="square" rtlCol="0">
+            <a:spAutoFit/>
+          </a:bodyPr>
+          <a:lstStyle/>
+          <a:p>
+            <a:r>
+              <a:rPr lang="en-US" b="1" i="1" dirty="0" smtClean="0"/>
+              <a:t>Power</a:t>
+            </a:r>
+            <a:endParaRPr lang="en-US" b="1" dirty="0" smtClean="0"/>
+          </a:p>
+          <a:p>
+            <a:r>
+              <a:rPr lang="en-US" dirty="0" smtClean="0">
+                <a:solidFill>
+                  <a:schemeClr val="accent1"/>
+                </a:solidFill>
+              </a:rPr>
+              <a:t>Batt  </a:t>
+            </a:r>
+            <a:r>
+              <a:rPr lang="en-US" dirty="0" smtClean="0">
+                <a:solidFill>
+                  <a:schemeClr val="accent2"/>
+                </a:solidFill>
+              </a:rPr>
+              <a:t>3.3v pin</a:t>
+            </a:r>
+          </a:p>
+          <a:p>
+            <a:r>
+              <a:rPr lang="en-US" dirty="0" smtClean="0">
+                <a:solidFill>
+                  <a:schemeClr val="accent2"/>
+                </a:solidFill>
+              </a:rPr>
+              <a:t>Microphone</a:t>
+            </a:r>
+          </a:p>
+          <a:p>
+            <a:r>
+              <a:rPr lang="en-US" dirty="0" smtClean="0">
+                <a:solidFill>
+                  <a:schemeClr val="accent1"/>
+                </a:solidFill>
+              </a:rPr>
+              <a:t>Servo 1</a:t>
+            </a:r>
+          </a:p>
+          <a:p>
+            <a:r>
+              <a:rPr lang="en-US" dirty="0" smtClean="0">
+                <a:solidFill>
+                  <a:schemeClr val="accent1"/>
+                </a:solidFill>
+              </a:rPr>
+              <a:t>Servo 2</a:t>
+            </a:r>
+          </a:p>
+          <a:p>
+            <a:endParaRPr lang="en-US" dirty="0" smtClean="0"/>
+          </a:p>
+          <a:p>
+            <a:r>
+              <a:rPr lang="en-US" b="1" i="1" dirty="0" smtClean="0"/>
+              <a:t>Gnd</a:t>
+            </a:r>
+            <a:endParaRPr lang="en-US" b="1" i="1" dirty="0"/>
+          </a:p>
+          <a:p>
+            <a:r>
+              <a:rPr lang="en-US" dirty="0" smtClean="0"/>
+              <a:t>Stress sensing</a:t>
+            </a:r>
+          </a:p>
+          <a:p>
+            <a:r>
+              <a:rPr lang="en-US" dirty="0" smtClean="0"/>
+              <a:t>Servo 1</a:t>
+            </a:r>
+          </a:p>
+          <a:p>
+            <a:r>
+              <a:rPr lang="en-US" dirty="0" smtClean="0"/>
+              <a:t>Servo 2</a:t>
+            </a:r>
+          </a:p>
+          <a:p>
+            <a:r>
+              <a:rPr lang="en-US" dirty="0" smtClean="0"/>
+              <a:t>Microphone</a:t>
+            </a:r>
+          </a:p>
+        </p:txBody>
+      </p:sp>
+      <p:sp>
+        <p:nvSpPr>
+          <p:cNvPr id="3" name="TextBox 2"/>
+          <p:cNvSpPr txBox="1"/>
+          <p:nvPr/>
+        </p:nvSpPr>
+        <p:spPr>
+          <a:xfrm>
+            <a:off x="7972616" y="617865"/>
+            <a:ext cx="2628900" cy="2308324"/>
+          </a:xfrm>
+          <a:prstGeom prst="rect">
+            <a:avLst/>
+          </a:prstGeom>
+          <a:noFill/>
+        </p:spPr>
+        <p:txBody>
+          <a:bodyPr wrap="square" rtlCol="0">
+            <a:spAutoFit/>
+          </a:bodyPr>
+          <a:lstStyle/>
+          <a:p>
+            <a:r>
+              <a:rPr lang="en-US" dirty="0" smtClean="0"/>
+              <a:t>(a0/5) = servo1 sig</a:t>
+            </a:r>
+          </a:p>
+          <a:p>
+            <a:r>
+              <a:rPr lang="en-US" dirty="0" smtClean="0"/>
+              <a:t>(c0/3) = servo2 sig</a:t>
+            </a:r>
+          </a:p>
+          <a:p>
+            <a:endParaRPr lang="en-US" dirty="0" smtClean="0"/>
+          </a:p>
+          <a:p>
+            <a:r>
+              <a:rPr lang="en-US" dirty="0" smtClean="0"/>
+              <a:t>(h0/A3) = stress</a:t>
+            </a:r>
+          </a:p>
+          <a:p>
+            <a:r>
+              <a:rPr lang="en-US" dirty="0" smtClean="0"/>
+              <a:t>(g0/A2) = mic</a:t>
+            </a:r>
+          </a:p>
+          <a:p>
+            <a:r>
+              <a:rPr lang="en-US" dirty="0" smtClean="0"/>
+              <a:t>(e0/A1)=light1</a:t>
+            </a:r>
+          </a:p>
+          <a:p>
+            <a:r>
+              <a:rPr lang="en-US" dirty="0" smtClean="0"/>
+              <a:t>(f0/A5)=light2</a:t>
+            </a:r>
+          </a:p>
+          <a:p>
+            <a:endParaRPr lang="en-US" dirty="0" smtClean="0"/>
+          </a:p>
+        </p:txBody>
+      </p:sp>
+      <p:sp>
+        <p:nvSpPr>
+          <p:cNvPr id="4" name="Rectangle 3"/>
+          <p:cNvSpPr/>
+          <p:nvPr/>
+        </p:nvSpPr>
+        <p:spPr>
+          <a:xfrm>
+            <a:off x="5567237" y="5790213"/>
+            <a:ext cx="1017585" cy="346002"/>
+          </a:xfrm>
+          <a:prstGeom prst="rect">
+            <a:avLst/>
+          </a:prstGeom>
+          <a:solidFill>
+            <a:schemeClr val="tx1">
+              <a:alpha val="50000"/>
+            </a:schemeClr>
+          </a:solidFill>
+          <a:ln>
+            <a:noFill/>
+          </a:ln>
+        </p:spPr>
+        <p:style>
+          <a:lnRef idx="2">
+            <a:schemeClr val="accent1">
+              <a:shade val="50000"/>
+            </a:schemeClr>
+          </a:lnRef>
+          <a:fillRef idx="1">
+            <a:schemeClr val="accent1"/>
+          </a:fillRef>
+          <a:effectRef idx="0">
+            <a:schemeClr val="accent1"/>
+          </a:effectRef>
+          <a:fontRef idx="minor">
+            <a:schemeClr val="lt1"/>
+          </a:fontRef>
+        </p:style>
+        <p:txBody>
+          <a:bodyPr rtlCol="0" anchor="ctr"/>
+          <a:lstStyle/>
+          <a:p>
+            <a:pPr algn="ctr"/>
+            <a:r>
+              <a:rPr lang="en-US" dirty="0" smtClean="0"/>
+              <a:t>GND</a:t>
+            </a:r>
+            <a:endParaRPr lang="en-US" dirty="0"/>
+          </a:p>
+        </p:txBody>
+      </p:sp>
+      <p:sp>
+        <p:nvSpPr>
+          <p:cNvPr id="19" name="Rectangle 18"/>
+          <p:cNvSpPr/>
+          <p:nvPr/>
+        </p:nvSpPr>
+        <p:spPr>
+          <a:xfrm rot="16200000">
+            <a:off x="6331221" y="5110466"/>
+            <a:ext cx="1933159" cy="361949"/>
+          </a:xfrm>
+          <a:prstGeom prst="rect">
+            <a:avLst/>
+          </a:prstGeom>
+          <a:solidFill>
+            <a:schemeClr val="tx1">
+              <a:alpha val="50000"/>
+            </a:schemeClr>
+          </a:solidFill>
+          <a:ln>
+            <a:noFill/>
+          </a:ln>
+        </p:spPr>
+        <p:style>
+          <a:lnRef idx="2">
+            <a:schemeClr val="accent1">
+              <a:shade val="50000"/>
+            </a:schemeClr>
+          </a:lnRef>
+          <a:fillRef idx="1">
+            <a:schemeClr val="accent1"/>
+          </a:fillRef>
+          <a:effectRef idx="0">
+            <a:schemeClr val="accent1"/>
+          </a:effectRef>
+          <a:fontRef idx="minor">
+            <a:schemeClr val="lt1"/>
+          </a:fontRef>
+        </p:style>
+        <p:txBody>
+          <a:bodyPr rtlCol="0" anchor="ctr"/>
+          <a:lstStyle/>
+          <a:p>
+            <a:pPr algn="ctr"/>
+            <a:r>
+              <a:rPr lang="en-US" dirty="0" smtClean="0"/>
+              <a:t>GND</a:t>
+            </a:r>
+            <a:endParaRPr lang="en-US" dirty="0"/>
+          </a:p>
+        </p:txBody>
+      </p:sp>
+      <p:sp>
+        <p:nvSpPr>
+          <p:cNvPr id="20" name="Rectangle 19"/>
+          <p:cNvSpPr/>
+          <p:nvPr/>
+        </p:nvSpPr>
+        <p:spPr>
+          <a:xfrm rot="5400000">
+            <a:off x="6902802" y="4456679"/>
+            <a:ext cx="1628964" cy="361949"/>
+          </a:xfrm>
+          <a:prstGeom prst="rect">
+            <a:avLst/>
+          </a:prstGeom>
+          <a:solidFill>
+            <a:srgbClr val="FF0000">
+              <a:alpha val="50000"/>
+            </a:srgbClr>
+          </a:solidFill>
+          <a:ln>
+            <a:noFill/>
+          </a:ln>
+        </p:spPr>
+        <p:style>
+          <a:lnRef idx="2">
+            <a:schemeClr val="accent1">
+              <a:shade val="50000"/>
+            </a:schemeClr>
+          </a:lnRef>
+          <a:fillRef idx="1">
+            <a:schemeClr val="accent1"/>
+          </a:fillRef>
+          <a:effectRef idx="0">
+            <a:schemeClr val="accent1"/>
+          </a:effectRef>
+          <a:fontRef idx="minor">
+            <a:schemeClr val="lt1"/>
+          </a:fontRef>
+        </p:style>
+        <p:txBody>
+          <a:bodyPr rtlCol="0" anchor="ctr"/>
+          <a:lstStyle/>
+          <a:p>
+            <a:pPr algn="ctr"/>
+            <a:r>
+              <a:rPr lang="en-US" dirty="0" smtClean="0"/>
+              <a:t>RAW</a:t>
+            </a:r>
+            <a:endParaRPr lang="en-US" dirty="0"/>
+          </a:p>
+        </p:txBody>
+      </p:sp>
+      <p:sp>
+        <p:nvSpPr>
+          <p:cNvPr id="16" name="Rectangle 15"/>
+          <p:cNvSpPr/>
+          <p:nvPr/>
+        </p:nvSpPr>
+        <p:spPr>
+          <a:xfrm rot="5400000">
+            <a:off x="5152383" y="4638753"/>
+            <a:ext cx="1880794" cy="292190"/>
+          </a:xfrm>
+          <a:prstGeom prst="rect">
+            <a:avLst/>
+          </a:prstGeom>
+          <a:solidFill>
+            <a:srgbClr val="FF0000">
+              <a:alpha val="50000"/>
+            </a:srgbClr>
+          </a:solidFill>
+          <a:ln>
+            <a:noFill/>
+          </a:ln>
+        </p:spPr>
+        <p:style>
+          <a:lnRef idx="2">
+            <a:schemeClr val="accent1">
+              <a:shade val="50000"/>
+            </a:schemeClr>
+          </a:lnRef>
+          <a:fillRef idx="1">
+            <a:schemeClr val="accent1"/>
+          </a:fillRef>
+          <a:effectRef idx="0">
+            <a:schemeClr val="accent1"/>
+          </a:effectRef>
+          <a:fontRef idx="minor">
+            <a:schemeClr val="lt1"/>
+          </a:fontRef>
+        </p:style>
+        <p:txBody>
+          <a:bodyPr rtlCol="0" anchor="ctr"/>
+          <a:lstStyle/>
+          <a:p>
+            <a:pPr algn="ctr"/>
+            <a:r>
+              <a:rPr lang="en-US" dirty="0" smtClean="0"/>
+              <a:t>VCC</a:t>
+            </a:r>
+          </a:p>
+        </p:txBody>
+      </p:sp>
+      <p:sp>
+        <p:nvSpPr>
+          <p:cNvPr id="17" name="Rectangle 16"/>
+          <p:cNvSpPr/>
+          <p:nvPr/>
+        </p:nvSpPr>
+        <p:spPr>
+          <a:xfrm>
+            <a:off x="5090281" y="6202024"/>
+            <a:ext cx="1219782" cy="404921"/>
+          </a:xfrm>
+          <a:prstGeom prst="rect">
+            <a:avLst/>
+          </a:prstGeom>
+          <a:solidFill>
+            <a:srgbClr val="FF0000">
+              <a:alpha val="50000"/>
+            </a:srgbClr>
+          </a:solidFill>
+          <a:ln>
+            <a:noFill/>
+          </a:ln>
+        </p:spPr>
+        <p:style>
+          <a:lnRef idx="2">
+            <a:schemeClr val="accent1">
+              <a:shade val="50000"/>
+            </a:schemeClr>
+          </a:lnRef>
+          <a:fillRef idx="1">
+            <a:schemeClr val="accent1"/>
+          </a:fillRef>
+          <a:effectRef idx="0">
+            <a:schemeClr val="accent1"/>
+          </a:effectRef>
+          <a:fontRef idx="minor">
+            <a:schemeClr val="lt1"/>
+          </a:fontRef>
+        </p:style>
+        <p:txBody>
+          <a:bodyPr rtlCol="0" anchor="ctr"/>
+          <a:lstStyle/>
+          <a:p>
+            <a:pPr algn="ctr"/>
+            <a:r>
+              <a:rPr lang="en-US" dirty="0" smtClean="0"/>
+              <a:t>MIC AVD</a:t>
+            </a:r>
+            <a:endParaRPr lang="en-US" dirty="0"/>
+          </a:p>
+        </p:txBody>
+      </p:sp>
+      <p:sp>
+        <p:nvSpPr>
+          <p:cNvPr id="18" name="Rectangle 17"/>
+          <p:cNvSpPr/>
+          <p:nvPr/>
+        </p:nvSpPr>
+        <p:spPr>
+          <a:xfrm rot="5400000">
+            <a:off x="4129306" y="4812441"/>
+            <a:ext cx="2365538" cy="404921"/>
+          </a:xfrm>
+          <a:prstGeom prst="rect">
+            <a:avLst/>
+          </a:prstGeom>
+          <a:solidFill>
+            <a:srgbClr val="FF0000">
+              <a:alpha val="50000"/>
+            </a:srgbClr>
+          </a:solidFill>
+          <a:ln>
+            <a:noFill/>
+          </a:ln>
+        </p:spPr>
+        <p:style>
+          <a:lnRef idx="2">
+            <a:schemeClr val="accent1">
+              <a:shade val="50000"/>
+            </a:schemeClr>
+          </a:lnRef>
+          <a:fillRef idx="1">
+            <a:schemeClr val="accent1"/>
+          </a:fillRef>
+          <a:effectRef idx="0">
+            <a:schemeClr val="accent1"/>
+          </a:effectRef>
+          <a:fontRef idx="minor">
+            <a:schemeClr val="lt1"/>
+          </a:fontRef>
+        </p:style>
+        <p:txBody>
+          <a:bodyPr rtlCol="0" anchor="ctr"/>
+          <a:lstStyle/>
+          <a:p>
+            <a:pPr algn="ctr"/>
+            <a:r>
+              <a:rPr lang="en-US" dirty="0" smtClean="0"/>
+              <a:t>MIC AVD</a:t>
+            </a:r>
+            <a:endParaRPr lang="en-US" dirty="0"/>
+          </a:p>
+        </p:txBody>
+      </p:sp>
+      <p:sp>
+        <p:nvSpPr>
+          <p:cNvPr id="2" name="TextBox 1"/>
+          <p:cNvSpPr txBox="1"/>
+          <p:nvPr/>
+        </p:nvSpPr>
+        <p:spPr>
+          <a:xfrm>
+            <a:off x="10466997" y="17790"/>
+            <a:ext cx="1787669" cy="5355312"/>
+          </a:xfrm>
+          <a:prstGeom prst="rect">
+            <a:avLst/>
+          </a:prstGeom>
+          <a:noFill/>
+        </p:spPr>
+        <p:txBody>
+          <a:bodyPr wrap="none" rtlCol="0">
+            <a:spAutoFit/>
+          </a:bodyPr>
+          <a:lstStyle/>
+          <a:p>
+            <a:r>
+              <a:rPr lang="en-US" dirty="0" err="1" smtClean="0"/>
+              <a:t>Mic.VCC</a:t>
+            </a:r>
+            <a:r>
+              <a:rPr lang="en-US" dirty="0" smtClean="0"/>
+              <a:t> = i4</a:t>
+            </a:r>
+          </a:p>
+          <a:p>
+            <a:r>
+              <a:rPr lang="en-US" dirty="0" err="1" smtClean="0"/>
+              <a:t>Mic.GND</a:t>
+            </a:r>
+            <a:r>
+              <a:rPr lang="en-US" dirty="0" smtClean="0"/>
+              <a:t> = i5</a:t>
+            </a:r>
+          </a:p>
+          <a:p>
+            <a:r>
+              <a:rPr lang="en-US" dirty="0" err="1" smtClean="0"/>
+              <a:t>Mic.AVD</a:t>
+            </a:r>
+            <a:r>
+              <a:rPr lang="en-US" dirty="0" smtClean="0"/>
+              <a:t> = i6</a:t>
+            </a:r>
+          </a:p>
+          <a:p>
+            <a:endParaRPr lang="en-US" dirty="0"/>
+          </a:p>
+          <a:p>
+            <a:r>
+              <a:rPr lang="en-US" dirty="0" smtClean="0"/>
+              <a:t>light1.VCC </a:t>
+            </a:r>
+            <a:r>
+              <a:rPr lang="en-US" dirty="0"/>
+              <a:t>= </a:t>
+            </a:r>
+            <a:r>
+              <a:rPr lang="en-US" dirty="0" smtClean="0"/>
+              <a:t>(i2)</a:t>
+            </a:r>
+          </a:p>
+          <a:p>
+            <a:r>
+              <a:rPr lang="en-US" dirty="0"/>
+              <a:t>light1.GND = (k3</a:t>
+            </a:r>
+            <a:r>
+              <a:rPr lang="en-US" dirty="0" smtClean="0"/>
+              <a:t>)</a:t>
+            </a:r>
+          </a:p>
+          <a:p>
+            <a:endParaRPr lang="en-US" dirty="0" smtClean="0"/>
+          </a:p>
+          <a:p>
+            <a:r>
+              <a:rPr lang="en-US" dirty="0" smtClean="0"/>
+              <a:t>light2.</a:t>
+            </a:r>
+            <a:r>
+              <a:rPr lang="en-US" dirty="0"/>
+              <a:t> VCC</a:t>
+            </a:r>
+            <a:r>
+              <a:rPr lang="en-US" dirty="0" smtClean="0"/>
+              <a:t> </a:t>
+            </a:r>
+            <a:r>
+              <a:rPr lang="en-US" dirty="0"/>
+              <a:t>= </a:t>
+            </a:r>
+            <a:r>
+              <a:rPr lang="en-US" dirty="0" smtClean="0"/>
+              <a:t>(i4)</a:t>
+            </a:r>
+            <a:endParaRPr lang="en-US" dirty="0"/>
+          </a:p>
+          <a:p>
+            <a:r>
+              <a:rPr lang="en-US" dirty="0"/>
+              <a:t>light2.res = (j3)</a:t>
+            </a:r>
+          </a:p>
+          <a:p>
+            <a:endParaRPr lang="en-US" dirty="0"/>
+          </a:p>
+          <a:p>
+            <a:r>
+              <a:rPr lang="en-US" dirty="0" err="1" smtClean="0"/>
+              <a:t>Batt.pos</a:t>
+            </a:r>
+            <a:r>
+              <a:rPr lang="en-US" dirty="0" smtClean="0"/>
+              <a:t> = (m6)</a:t>
+            </a:r>
+          </a:p>
+          <a:p>
+            <a:r>
+              <a:rPr lang="en-US" dirty="0" err="1" smtClean="0"/>
+              <a:t>Batt.neg</a:t>
+            </a:r>
+            <a:r>
+              <a:rPr lang="en-US" dirty="0" smtClean="0"/>
+              <a:t> </a:t>
+            </a:r>
+            <a:r>
+              <a:rPr lang="en-US" dirty="0"/>
+              <a:t>= </a:t>
+            </a:r>
+            <a:r>
+              <a:rPr lang="en-US" dirty="0" smtClean="0"/>
+              <a:t>(l5</a:t>
+            </a:r>
+            <a:r>
+              <a:rPr lang="en-US" dirty="0" smtClean="0"/>
+              <a:t>)</a:t>
+            </a:r>
+          </a:p>
+          <a:p>
+            <a:endParaRPr lang="en-US" dirty="0"/>
+          </a:p>
+          <a:p>
+            <a:r>
+              <a:rPr lang="en-US" dirty="0" smtClean="0"/>
+              <a:t>Servo1.GND = h1</a:t>
+            </a:r>
+          </a:p>
+          <a:p>
+            <a:r>
+              <a:rPr lang="en-US" dirty="0" smtClean="0"/>
+              <a:t>Servo2.GND = h2</a:t>
+            </a:r>
+          </a:p>
+          <a:p>
+            <a:endParaRPr lang="en-US" dirty="0" smtClean="0"/>
+          </a:p>
+          <a:p>
+            <a:r>
+              <a:rPr lang="en-US" dirty="0" smtClean="0"/>
+              <a:t>Servo1.VCC = m1</a:t>
+            </a:r>
+            <a:endParaRPr lang="en-US" dirty="0"/>
+          </a:p>
+          <a:p>
+            <a:r>
+              <a:rPr lang="en-US" dirty="0" smtClean="0"/>
+              <a:t>Servo2.VCC </a:t>
+            </a:r>
+            <a:r>
+              <a:rPr lang="en-US" dirty="0"/>
+              <a:t>= m</a:t>
+            </a:r>
+            <a:r>
+              <a:rPr lang="en-US" dirty="0" smtClean="0"/>
+              <a:t>2</a:t>
+            </a:r>
+            <a:endParaRPr lang="en-US" dirty="0"/>
+          </a:p>
+          <a:p>
+            <a:endParaRPr lang="en-US" dirty="0"/>
+          </a:p>
+        </p:txBody>
+      </p:sp>
+      <p:sp>
+        <p:nvSpPr>
+          <p:cNvPr id="24" name="Rectangle 23"/>
+          <p:cNvSpPr/>
+          <p:nvPr/>
+        </p:nvSpPr>
+        <p:spPr>
+          <a:xfrm rot="16200000">
+            <a:off x="5969310" y="4256271"/>
+            <a:ext cx="1069728" cy="404921"/>
+          </a:xfrm>
+          <a:prstGeom prst="rect">
+            <a:avLst/>
+          </a:prstGeom>
+          <a:solidFill>
+            <a:srgbClr val="FF0000">
+              <a:alpha val="50000"/>
+            </a:srgbClr>
+          </a:solidFill>
+          <a:ln>
+            <a:noFill/>
+          </a:ln>
+        </p:spPr>
+        <p:style>
+          <a:lnRef idx="2">
+            <a:schemeClr val="accent1">
+              <a:shade val="50000"/>
+            </a:schemeClr>
+          </a:lnRef>
+          <a:fillRef idx="1">
+            <a:schemeClr val="accent1"/>
+          </a:fillRef>
+          <a:effectRef idx="0">
+            <a:schemeClr val="accent1"/>
+          </a:effectRef>
+          <a:fontRef idx="minor">
+            <a:schemeClr val="lt1"/>
+          </a:fontRef>
+        </p:style>
+        <p:txBody>
+          <a:bodyPr rtlCol="0" anchor="ctr"/>
+          <a:lstStyle/>
+          <a:p>
+            <a:pPr algn="ctr"/>
+            <a:r>
+              <a:rPr lang="en-US" dirty="0" smtClean="0"/>
+              <a:t>10k</a:t>
+            </a:r>
+            <a:r>
+              <a:rPr lang="el-GR" i="1" dirty="0"/>
+              <a:t>Ω</a:t>
+            </a:r>
+            <a:endParaRPr lang="en-US" dirty="0"/>
+          </a:p>
+        </p:txBody>
+      </p:sp>
+      <p:sp>
+        <p:nvSpPr>
+          <p:cNvPr id="26" name="Rectangle 25"/>
+          <p:cNvSpPr/>
+          <p:nvPr/>
+        </p:nvSpPr>
+        <p:spPr>
+          <a:xfrm rot="16200000">
+            <a:off x="6888619" y="5694945"/>
+            <a:ext cx="1598371" cy="346002"/>
+          </a:xfrm>
+          <a:prstGeom prst="rect">
+            <a:avLst/>
+          </a:prstGeom>
+          <a:solidFill>
+            <a:srgbClr val="FFFF00">
+              <a:alpha val="50000"/>
+            </a:srgbClr>
+          </a:solidFill>
+          <a:ln>
+            <a:noFill/>
+          </a:ln>
+        </p:spPr>
+        <p:style>
+          <a:lnRef idx="2">
+            <a:schemeClr val="accent1">
+              <a:shade val="50000"/>
+            </a:schemeClr>
+          </a:lnRef>
+          <a:fillRef idx="1">
+            <a:schemeClr val="accent1"/>
+          </a:fillRef>
+          <a:effectRef idx="0">
+            <a:schemeClr val="accent1"/>
+          </a:effectRef>
+          <a:fontRef idx="minor">
+            <a:schemeClr val="lt1"/>
+          </a:fontRef>
+        </p:style>
+        <p:txBody>
+          <a:bodyPr rtlCol="0" anchor="ctr"/>
+          <a:lstStyle/>
+          <a:p>
+            <a:pPr algn="ctr"/>
+            <a:r>
+              <a:rPr lang="en-US" dirty="0" smtClean="0">
+                <a:solidFill>
+                  <a:schemeClr val="accent1"/>
+                </a:solidFill>
+              </a:rPr>
+              <a:t>SWITCH</a:t>
+            </a:r>
+            <a:endParaRPr lang="en-US" dirty="0">
+              <a:solidFill>
+                <a:schemeClr val="accent1"/>
+              </a:solidFill>
+            </a:endParaRPr>
+          </a:p>
+        </p:txBody>
+      </p:sp>
+      <p:sp>
+        <p:nvSpPr>
+          <p:cNvPr id="27" name="Rectangle 26"/>
+          <p:cNvSpPr/>
+          <p:nvPr/>
+        </p:nvSpPr>
+        <p:spPr>
+          <a:xfrm rot="5400000">
+            <a:off x="5173114" y="5416857"/>
+            <a:ext cx="1057992" cy="254080"/>
+          </a:xfrm>
+          <a:prstGeom prst="rect">
+            <a:avLst/>
+          </a:prstGeom>
+          <a:solidFill>
+            <a:srgbClr val="FF0000">
+              <a:alpha val="50000"/>
+            </a:srgbClr>
+          </a:solidFill>
+          <a:ln>
+            <a:noFill/>
+          </a:ln>
+        </p:spPr>
+        <p:style>
+          <a:lnRef idx="2">
+            <a:schemeClr val="accent1">
+              <a:shade val="50000"/>
+            </a:schemeClr>
+          </a:lnRef>
+          <a:fillRef idx="1">
+            <a:schemeClr val="accent1"/>
+          </a:fillRef>
+          <a:effectRef idx="0">
+            <a:schemeClr val="accent1"/>
+          </a:effectRef>
+          <a:fontRef idx="minor">
+            <a:schemeClr val="lt1"/>
+          </a:fontRef>
+        </p:style>
+        <p:txBody>
+          <a:bodyPr rtlCol="0" anchor="ctr"/>
+          <a:lstStyle/>
+          <a:p>
+            <a:pPr algn="ctr"/>
+            <a:r>
+              <a:rPr lang="en-US" dirty="0" smtClean="0"/>
+              <a:t>1</a:t>
+            </a:r>
+            <a:r>
+              <a:rPr lang="el-GR" i="1" dirty="0" smtClean="0"/>
+              <a:t>Ω</a:t>
+            </a:r>
+            <a:endParaRPr lang="en-US" dirty="0"/>
+          </a:p>
+        </p:txBody>
+      </p:sp>
+      <p:sp>
+        <p:nvSpPr>
+          <p:cNvPr id="29" name="Rectangle 28"/>
+          <p:cNvSpPr/>
+          <p:nvPr/>
+        </p:nvSpPr>
+        <p:spPr>
+          <a:xfrm rot="5400000">
+            <a:off x="5156431" y="4339323"/>
+            <a:ext cx="1127600" cy="254080"/>
+          </a:xfrm>
+          <a:prstGeom prst="rect">
+            <a:avLst/>
+          </a:prstGeom>
+          <a:solidFill>
+            <a:srgbClr val="FF0000">
+              <a:alpha val="50000"/>
+            </a:srgbClr>
+          </a:solidFill>
+          <a:ln>
+            <a:noFill/>
+          </a:ln>
+        </p:spPr>
+        <p:style>
+          <a:lnRef idx="2">
+            <a:schemeClr val="accent1">
+              <a:shade val="50000"/>
+            </a:schemeClr>
+          </a:lnRef>
+          <a:fillRef idx="1">
+            <a:schemeClr val="accent1"/>
+          </a:fillRef>
+          <a:effectRef idx="0">
+            <a:schemeClr val="accent1"/>
+          </a:effectRef>
+          <a:fontRef idx="minor">
+            <a:schemeClr val="lt1"/>
+          </a:fontRef>
+        </p:style>
+        <p:txBody>
+          <a:bodyPr rtlCol="0" anchor="ctr"/>
+          <a:lstStyle/>
+          <a:p>
+            <a:pPr algn="ctr"/>
+            <a:r>
+              <a:rPr lang="en-US" dirty="0" smtClean="0"/>
+              <a:t>1</a:t>
+            </a:r>
+            <a:r>
+              <a:rPr lang="el-GR" i="1" dirty="0" smtClean="0"/>
+              <a:t>Ω</a:t>
+            </a:r>
+            <a:r>
+              <a:rPr lang="en-US" i="1" dirty="0" smtClean="0"/>
+              <a:t>-line</a:t>
+            </a:r>
+            <a:endParaRPr lang="en-US" dirty="0"/>
+          </a:p>
+        </p:txBody>
+      </p:sp>
+      <p:sp>
+        <p:nvSpPr>
+          <p:cNvPr id="32" name="Rectangle 31"/>
+          <p:cNvSpPr/>
+          <p:nvPr/>
+        </p:nvSpPr>
+        <p:spPr>
+          <a:xfrm>
+            <a:off x="7136702" y="3902563"/>
+            <a:ext cx="354739" cy="361949"/>
+          </a:xfrm>
+          <a:prstGeom prst="rect">
+            <a:avLst/>
+          </a:prstGeom>
+          <a:solidFill>
+            <a:srgbClr val="FF0000">
+              <a:alpha val="50000"/>
+            </a:srgbClr>
+          </a:solidFill>
+          <a:ln>
+            <a:noFill/>
+          </a:ln>
+        </p:spPr>
+        <p:style>
+          <a:lnRef idx="2">
+            <a:schemeClr val="accent1">
+              <a:shade val="50000"/>
+            </a:schemeClr>
+          </a:lnRef>
+          <a:fillRef idx="1">
+            <a:schemeClr val="accent1"/>
+          </a:fillRef>
+          <a:effectRef idx="0">
+            <a:schemeClr val="accent1"/>
+          </a:effectRef>
+          <a:fontRef idx="minor">
+            <a:schemeClr val="lt1"/>
+          </a:fontRef>
+        </p:style>
+        <p:txBody>
+          <a:bodyPr rtlCol="0" anchor="ctr"/>
+          <a:lstStyle/>
+          <a:p>
+            <a:pPr algn="ctr"/>
+            <a:r>
+              <a:rPr lang="en-US" dirty="0" smtClean="0"/>
+              <a:t>RAW</a:t>
+            </a:r>
+            <a:endParaRPr lang="en-US" dirty="0"/>
+          </a:p>
+        </p:txBody>
+      </p:sp>
+      <p:sp>
+        <p:nvSpPr>
+          <p:cNvPr id="33" name="Rectangle 32"/>
+          <p:cNvSpPr/>
+          <p:nvPr/>
+        </p:nvSpPr>
+        <p:spPr>
+          <a:xfrm rot="16200000">
+            <a:off x="6573502" y="4003438"/>
+            <a:ext cx="679924" cy="361949"/>
+          </a:xfrm>
+          <a:prstGeom prst="rect">
+            <a:avLst/>
+          </a:prstGeom>
+          <a:solidFill>
+            <a:schemeClr val="tx1">
+              <a:alpha val="50000"/>
+            </a:schemeClr>
+          </a:solidFill>
+          <a:ln>
+            <a:noFill/>
+          </a:ln>
+        </p:spPr>
+        <p:style>
+          <a:lnRef idx="2">
+            <a:schemeClr val="accent1">
+              <a:shade val="50000"/>
+            </a:schemeClr>
+          </a:lnRef>
+          <a:fillRef idx="1">
+            <a:schemeClr val="accent1"/>
+          </a:fillRef>
+          <a:effectRef idx="0">
+            <a:schemeClr val="accent1"/>
+          </a:effectRef>
+          <a:fontRef idx="minor">
+            <a:schemeClr val="lt1"/>
+          </a:fontRef>
+        </p:style>
+        <p:txBody>
+          <a:bodyPr rtlCol="0" anchor="ctr"/>
+          <a:lstStyle/>
+          <a:p>
+            <a:pPr algn="ctr"/>
+            <a:r>
+              <a:rPr lang="en-US" dirty="0" smtClean="0"/>
+              <a:t>GND</a:t>
+            </a:r>
+            <a:endParaRPr lang="en-US" dirty="0"/>
+          </a:p>
+        </p:txBody>
+      </p:sp>
+      <p:sp>
+        <p:nvSpPr>
+          <p:cNvPr id="37" name="Rectangle 36"/>
+          <p:cNvSpPr/>
+          <p:nvPr/>
+        </p:nvSpPr>
+        <p:spPr>
+          <a:xfrm rot="16200000">
+            <a:off x="6418968" y="5760688"/>
+            <a:ext cx="966107" cy="404921"/>
+          </a:xfrm>
+          <a:prstGeom prst="rect">
+            <a:avLst/>
+          </a:prstGeom>
+          <a:solidFill>
+            <a:srgbClr val="FF0000">
+              <a:alpha val="50000"/>
+            </a:srgbClr>
+          </a:solidFill>
+          <a:ln>
+            <a:noFill/>
+          </a:ln>
+        </p:spPr>
+        <p:style>
+          <a:lnRef idx="2">
+            <a:schemeClr val="accent1">
+              <a:shade val="50000"/>
+            </a:schemeClr>
+          </a:lnRef>
+          <a:fillRef idx="1">
+            <a:schemeClr val="accent1"/>
+          </a:fillRef>
+          <a:effectRef idx="0">
+            <a:schemeClr val="accent1"/>
+          </a:effectRef>
+          <a:fontRef idx="minor">
+            <a:schemeClr val="lt1"/>
+          </a:fontRef>
+        </p:style>
+        <p:txBody>
+          <a:bodyPr rtlCol="0" anchor="ctr"/>
+          <a:lstStyle/>
+          <a:p>
+            <a:pPr algn="ctr"/>
+            <a:r>
+              <a:rPr lang="en-US" dirty="0" smtClean="0"/>
+              <a:t>10k</a:t>
+            </a:r>
+            <a:r>
+              <a:rPr lang="el-GR" i="1" dirty="0"/>
+              <a:t>Ω</a:t>
+            </a:r>
+            <a:endParaRPr lang="en-US" dirty="0"/>
+          </a:p>
+        </p:txBody>
+      </p:sp>
+      <p:sp>
+        <p:nvSpPr>
+          <p:cNvPr id="38" name="Rectangle 37"/>
+          <p:cNvSpPr/>
+          <p:nvPr/>
+        </p:nvSpPr>
+        <p:spPr>
+          <a:xfrm>
+            <a:off x="5969284" y="4562503"/>
+            <a:ext cx="1069728" cy="404921"/>
+          </a:xfrm>
+          <a:prstGeom prst="rect">
+            <a:avLst/>
+          </a:prstGeom>
+          <a:solidFill>
+            <a:schemeClr val="accent6">
+              <a:lumMod val="75000"/>
+              <a:alpha val="50000"/>
+            </a:schemeClr>
+          </a:solidFill>
+          <a:ln>
+            <a:noFill/>
+          </a:ln>
+        </p:spPr>
+        <p:style>
+          <a:lnRef idx="2">
+            <a:schemeClr val="accent1">
+              <a:shade val="50000"/>
+            </a:schemeClr>
+          </a:lnRef>
+          <a:fillRef idx="1">
+            <a:schemeClr val="accent1"/>
+          </a:fillRef>
+          <a:effectRef idx="0">
+            <a:schemeClr val="accent1"/>
+          </a:effectRef>
+          <a:fontRef idx="minor">
+            <a:schemeClr val="lt1"/>
+          </a:fontRef>
+        </p:style>
+        <p:txBody>
+          <a:bodyPr rtlCol="0" anchor="ctr"/>
+          <a:lstStyle/>
+          <a:p>
+            <a:pPr algn="ctr"/>
+            <a:r>
+              <a:rPr lang="en-US" dirty="0" smtClean="0"/>
+              <a:t>light1</a:t>
+            </a:r>
+          </a:p>
+        </p:txBody>
+      </p:sp>
+      <p:sp>
+        <p:nvSpPr>
+          <p:cNvPr id="40" name="Rectangle 39"/>
+          <p:cNvSpPr/>
+          <p:nvPr/>
+        </p:nvSpPr>
+        <p:spPr>
+          <a:xfrm>
+            <a:off x="5924101" y="5023626"/>
+            <a:ext cx="732952" cy="404921"/>
+          </a:xfrm>
+          <a:prstGeom prst="rect">
+            <a:avLst/>
+          </a:prstGeom>
+          <a:solidFill>
+            <a:schemeClr val="accent6">
+              <a:lumMod val="75000"/>
+              <a:alpha val="50000"/>
+            </a:schemeClr>
+          </a:solidFill>
+          <a:ln>
+            <a:noFill/>
+          </a:ln>
+        </p:spPr>
+        <p:style>
+          <a:lnRef idx="2">
+            <a:schemeClr val="accent1">
+              <a:shade val="50000"/>
+            </a:schemeClr>
+          </a:lnRef>
+          <a:fillRef idx="1">
+            <a:schemeClr val="accent1"/>
+          </a:fillRef>
+          <a:effectRef idx="0">
+            <a:schemeClr val="accent1"/>
+          </a:effectRef>
+          <a:fontRef idx="minor">
+            <a:schemeClr val="lt1"/>
+          </a:fontRef>
+        </p:style>
+        <p:txBody>
+          <a:bodyPr rtlCol="0" anchor="ctr"/>
+          <a:lstStyle/>
+          <a:p>
+            <a:pPr algn="ctr"/>
+            <a:r>
+              <a:rPr lang="en-US" dirty="0" smtClean="0"/>
+              <a:t>light2</a:t>
+            </a:r>
+          </a:p>
+        </p:txBody>
+      </p:sp>
+      <p:sp>
+        <p:nvSpPr>
+          <p:cNvPr id="42" name="Rectangle 41"/>
+          <p:cNvSpPr/>
+          <p:nvPr/>
+        </p:nvSpPr>
+        <p:spPr>
+          <a:xfrm>
+            <a:off x="6316380" y="3851630"/>
+            <a:ext cx="679924" cy="361949"/>
+          </a:xfrm>
+          <a:prstGeom prst="rect">
+            <a:avLst/>
+          </a:prstGeom>
+          <a:solidFill>
+            <a:schemeClr val="tx1">
+              <a:alpha val="50000"/>
+            </a:schemeClr>
+          </a:solidFill>
+          <a:ln>
+            <a:noFill/>
+          </a:ln>
+        </p:spPr>
+        <p:style>
+          <a:lnRef idx="2">
+            <a:schemeClr val="accent1">
+              <a:shade val="50000"/>
+            </a:schemeClr>
+          </a:lnRef>
+          <a:fillRef idx="1">
+            <a:schemeClr val="accent1"/>
+          </a:fillRef>
+          <a:effectRef idx="0">
+            <a:schemeClr val="accent1"/>
+          </a:effectRef>
+          <a:fontRef idx="minor">
+            <a:schemeClr val="lt1"/>
+          </a:fontRef>
+        </p:style>
+        <p:txBody>
+          <a:bodyPr rtlCol="0" anchor="ctr"/>
+          <a:lstStyle/>
+          <a:p>
+            <a:pPr algn="ctr"/>
+            <a:r>
+              <a:rPr lang="en-US" dirty="0" smtClean="0"/>
+              <a:t>GND</a:t>
+            </a:r>
+            <a:endParaRPr lang="en-US" dirty="0"/>
+          </a:p>
+        </p:txBody>
+      </p:sp>
+      <p:sp>
+        <p:nvSpPr>
+          <p:cNvPr id="43" name="Rectangle 42"/>
+          <p:cNvSpPr/>
+          <p:nvPr/>
+        </p:nvSpPr>
+        <p:spPr>
+          <a:xfrm rot="5400000">
+            <a:off x="5542596" y="5811518"/>
+            <a:ext cx="1098888" cy="436045"/>
+          </a:xfrm>
+          <a:prstGeom prst="rect">
+            <a:avLst/>
+          </a:prstGeom>
+          <a:solidFill>
+            <a:srgbClr val="FFFF00">
+              <a:alpha val="50000"/>
+            </a:srgbClr>
+          </a:solidFill>
+          <a:ln>
+            <a:noFill/>
+          </a:ln>
+        </p:spPr>
+        <p:style>
+          <a:lnRef idx="2">
+            <a:schemeClr val="accent1">
+              <a:shade val="50000"/>
+            </a:schemeClr>
+          </a:lnRef>
+          <a:fillRef idx="1">
+            <a:schemeClr val="accent1"/>
+          </a:fillRef>
+          <a:effectRef idx="0">
+            <a:schemeClr val="accent1"/>
+          </a:effectRef>
+          <a:fontRef idx="minor">
+            <a:schemeClr val="lt1"/>
+          </a:fontRef>
+        </p:style>
+        <p:txBody>
+          <a:bodyPr rtlCol="0" anchor="ctr"/>
+          <a:lstStyle/>
+          <a:p>
+            <a:pPr algn="ctr"/>
+            <a:r>
+              <a:rPr lang="en-US" dirty="0" smtClean="0">
+                <a:solidFill>
+                  <a:schemeClr val="accent1"/>
+                </a:solidFill>
+              </a:rPr>
+              <a:t>MIC</a:t>
+            </a:r>
+            <a:endParaRPr lang="en-US" dirty="0">
+              <a:solidFill>
+                <a:schemeClr val="accent1"/>
+              </a:solidFill>
+            </a:endParaRPr>
+          </a:p>
+        </p:txBody>
+      </p:sp>
+      <p:sp>
+        <p:nvSpPr>
+          <p:cNvPr id="44" name="Rectangle 43"/>
+          <p:cNvSpPr/>
+          <p:nvPr/>
+        </p:nvSpPr>
+        <p:spPr>
+          <a:xfrm>
+            <a:off x="6340288" y="6222135"/>
+            <a:ext cx="1078647" cy="346002"/>
+          </a:xfrm>
+          <a:prstGeom prst="rect">
+            <a:avLst/>
+          </a:prstGeom>
+          <a:solidFill>
+            <a:schemeClr val="tx1">
+              <a:alpha val="50000"/>
+            </a:schemeClr>
+          </a:solidFill>
+          <a:ln>
+            <a:noFill/>
+          </a:ln>
+        </p:spPr>
+        <p:style>
+          <a:lnRef idx="2">
+            <a:schemeClr val="accent1">
+              <a:shade val="50000"/>
+            </a:schemeClr>
+          </a:lnRef>
+          <a:fillRef idx="1">
+            <a:schemeClr val="accent1"/>
+          </a:fillRef>
+          <a:effectRef idx="0">
+            <a:schemeClr val="accent1"/>
+          </a:effectRef>
+          <a:fontRef idx="minor">
+            <a:schemeClr val="lt1"/>
+          </a:fontRef>
+        </p:style>
+        <p:txBody>
+          <a:bodyPr rtlCol="0" anchor="ctr"/>
+          <a:lstStyle/>
+          <a:p>
+            <a:pPr algn="ctr"/>
+            <a:r>
+              <a:rPr lang="en-US" dirty="0" smtClean="0"/>
+              <a:t>GND</a:t>
+            </a:r>
+            <a:endParaRPr lang="en-US" dirty="0"/>
+          </a:p>
+        </p:txBody>
+      </p:sp>
+      <p:sp>
+        <p:nvSpPr>
+          <p:cNvPr id="45" name="Rectangle 44"/>
+          <p:cNvSpPr/>
+          <p:nvPr/>
+        </p:nvSpPr>
+        <p:spPr>
+          <a:xfrm>
+            <a:off x="6706635" y="5030163"/>
+            <a:ext cx="467760" cy="404921"/>
+          </a:xfrm>
+          <a:prstGeom prst="rect">
+            <a:avLst/>
+          </a:prstGeom>
+          <a:solidFill>
+            <a:schemeClr val="accent6">
+              <a:lumMod val="75000"/>
+              <a:alpha val="50000"/>
+            </a:schemeClr>
+          </a:solidFill>
+          <a:ln>
+            <a:noFill/>
+          </a:ln>
+        </p:spPr>
+        <p:style>
+          <a:lnRef idx="2">
+            <a:schemeClr val="accent1">
+              <a:shade val="50000"/>
+            </a:schemeClr>
+          </a:lnRef>
+          <a:fillRef idx="1">
+            <a:schemeClr val="accent1"/>
+          </a:fillRef>
+          <a:effectRef idx="0">
+            <a:schemeClr val="accent1"/>
+          </a:effectRef>
+          <a:fontRef idx="minor">
+            <a:schemeClr val="lt1"/>
+          </a:fontRef>
+        </p:style>
+        <p:txBody>
+          <a:bodyPr rtlCol="0" anchor="ctr"/>
+          <a:lstStyle/>
+          <a:p>
+            <a:pPr algn="ctr"/>
+            <a:r>
+              <a:rPr lang="en-US" dirty="0" smtClean="0"/>
+              <a:t>A5</a:t>
+            </a:r>
+          </a:p>
+        </p:txBody>
+      </p:sp>
+      <p:sp>
+        <p:nvSpPr>
+          <p:cNvPr id="46" name="Rectangle 45"/>
+          <p:cNvSpPr/>
+          <p:nvPr/>
+        </p:nvSpPr>
+        <p:spPr>
+          <a:xfrm>
+            <a:off x="6286316" y="5452134"/>
+            <a:ext cx="467760" cy="404921"/>
+          </a:xfrm>
+          <a:prstGeom prst="rect">
+            <a:avLst/>
+          </a:prstGeom>
+          <a:solidFill>
+            <a:schemeClr val="accent6">
+              <a:lumMod val="75000"/>
+              <a:alpha val="50000"/>
+            </a:schemeClr>
+          </a:solidFill>
+          <a:ln>
+            <a:noFill/>
+          </a:ln>
+        </p:spPr>
+        <p:style>
+          <a:lnRef idx="2">
+            <a:schemeClr val="accent1">
+              <a:shade val="50000"/>
+            </a:schemeClr>
+          </a:lnRef>
+          <a:fillRef idx="1">
+            <a:schemeClr val="accent1"/>
+          </a:fillRef>
+          <a:effectRef idx="0">
+            <a:schemeClr val="accent1"/>
+          </a:effectRef>
+          <a:fontRef idx="minor">
+            <a:schemeClr val="lt1"/>
+          </a:fontRef>
+        </p:style>
+        <p:txBody>
+          <a:bodyPr rtlCol="0" anchor="ctr"/>
+          <a:lstStyle/>
+          <a:p>
+            <a:pPr algn="ctr"/>
+            <a:r>
+              <a:rPr lang="en-US" dirty="0" smtClean="0"/>
+              <a:t>A1</a:t>
+            </a:r>
+          </a:p>
+        </p:txBody>
+      </p:sp>
+      <p:sp>
+        <p:nvSpPr>
+          <p:cNvPr id="47" name="Rectangle 46"/>
+          <p:cNvSpPr/>
+          <p:nvPr/>
+        </p:nvSpPr>
+        <p:spPr>
+          <a:xfrm rot="5400000">
+            <a:off x="7135131" y="5862546"/>
+            <a:ext cx="1126852" cy="361949"/>
+          </a:xfrm>
+          <a:prstGeom prst="rect">
+            <a:avLst/>
+          </a:prstGeom>
+          <a:solidFill>
+            <a:srgbClr val="FF0000">
+              <a:alpha val="50000"/>
+            </a:srgbClr>
+          </a:solidFill>
+          <a:ln>
+            <a:noFill/>
+          </a:ln>
+        </p:spPr>
+        <p:style>
+          <a:lnRef idx="2">
+            <a:schemeClr val="accent1">
+              <a:shade val="50000"/>
+            </a:schemeClr>
+          </a:lnRef>
+          <a:fillRef idx="1">
+            <a:schemeClr val="accent1"/>
+          </a:fillRef>
+          <a:effectRef idx="0">
+            <a:schemeClr val="accent1"/>
+          </a:effectRef>
+          <a:fontRef idx="minor">
+            <a:schemeClr val="lt1"/>
+          </a:fontRef>
+        </p:style>
+        <p:txBody>
+          <a:bodyPr rtlCol="0" anchor="ctr"/>
+          <a:lstStyle/>
+          <a:p>
+            <a:pPr algn="ctr"/>
+            <a:r>
+              <a:rPr lang="en-US" dirty="0" smtClean="0"/>
+              <a:t>RAW</a:t>
+            </a:r>
+            <a:endParaRPr lang="en-US" dirty="0"/>
+          </a:p>
+        </p:txBody>
+      </p:sp>
+    </p:spTree>
+    <p:extLst>
+      <p:ext uri="{BB962C8B-B14F-4D97-AF65-F5344CB8AC3E}">
+        <p14:creationId xmlns:p14="http://schemas.microsoft.com/office/powerpoint/2010/main" val="1752708094"/>
+      </p:ext>
+    </p:extLst>
+  </p:cSld>
+  <p:clrMapOvr>
+    <a:masterClrMapping/>
+  </p:clrMapOvr>
+</p:sld>
+</file>
+
 <file path=ppt/theme/theme1.xml><?xml version="1.0" encoding="utf-8"?>
 <a:theme xmlns:a="http://schemas.openxmlformats.org/drawingml/2006/main" name="Office Theme">
   <a:themeElements>

</xml_diff>